<commit_message>
Presentation et proto Visuel
</commit_message>
<xml_diff>
--- a/Administratif/Presentation intermediare/Presentation intermédiaire.pptx
+++ b/Administratif/Presentation intermediare/Presentation intermédiaire.pptx
@@ -5,14 +5,20 @@
     <p:sldMasterId id="2147483648" r:id="rId1"/>
   </p:sldMasterIdLst>
   <p:notesMasterIdLst>
-    <p:notesMasterId r:id="rId7"/>
+    <p:notesMasterId r:id="rId13"/>
   </p:notesMasterIdLst>
   <p:sldIdLst>
     <p:sldId id="256" r:id="rId2"/>
-    <p:sldId id="258" r:id="rId3"/>
-    <p:sldId id="259" r:id="rId4"/>
-    <p:sldId id="260" r:id="rId5"/>
-    <p:sldId id="257" r:id="rId6"/>
+    <p:sldId id="261" r:id="rId3"/>
+    <p:sldId id="263" r:id="rId4"/>
+    <p:sldId id="266" r:id="rId5"/>
+    <p:sldId id="259" r:id="rId6"/>
+    <p:sldId id="258" r:id="rId7"/>
+    <p:sldId id="260" r:id="rId8"/>
+    <p:sldId id="262" r:id="rId9"/>
+    <p:sldId id="264" r:id="rId10"/>
+    <p:sldId id="265" r:id="rId11"/>
+    <p:sldId id="257" r:id="rId12"/>
   </p:sldIdLst>
   <p:sldSz cx="12192000" cy="6858000"/>
   <p:notesSz cx="6858000" cy="9144000"/>
@@ -113,13 +119,7 @@
   </p:defaultTextStyle>
   <p:extLst>
     <p:ext uri="{EFAFB233-063F-42B5-8137-9DF3F51BA10A}">
-      <p15:sldGuideLst xmlns:p15="http://schemas.microsoft.com/office/powerpoint/2012/main">
-        <p15:guide id="1" pos="3840" userDrawn="1">
-          <p15:clr>
-            <a:srgbClr val="A4A3A4"/>
-          </p15:clr>
-        </p15:guide>
-      </p15:sldGuideLst>
+      <p15:sldGuideLst xmlns:p15="http://schemas.microsoft.com/office/powerpoint/2012/main"/>
     </p:ext>
   </p:extLst>
 </p:presentation>
@@ -207,7 +207,7 @@
           <a:p>
             <a:fld id="{D59C19E5-BFBB-4E1D-93B3-8FDAC835B1E4}" type="datetimeFigureOut">
               <a:rPr lang="en-US" smtClean="0"/>
-              <a:t>6/12/2016</a:t>
+              <a:t>6/16/2016</a:t>
             </a:fld>
             <a:endParaRPr lang="en-US"/>
           </a:p>
@@ -567,6 +567,90 @@
 </p:notes>
 </file>
 
+<file path=ppt/notesSlides/notesSlide2.xml><?xml version="1.0" encoding="utf-8"?>
+<p:notes xmlns:a="http://schemas.openxmlformats.org/drawingml/2006/main" xmlns:r="http://schemas.openxmlformats.org/officeDocument/2006/relationships" xmlns:p="http://schemas.openxmlformats.org/presentationml/2006/main">
+  <p:cSld>
+    <p:spTree>
+      <p:nvGrpSpPr>
+        <p:cNvPr id="1" name=""/>
+        <p:cNvGrpSpPr/>
+        <p:nvPr/>
+      </p:nvGrpSpPr>
+      <p:grpSpPr>
+        <a:xfrm>
+          <a:off x="0" y="0"/>
+          <a:ext cx="0" cy="0"/>
+          <a:chOff x="0" y="0"/>
+          <a:chExt cx="0" cy="0"/>
+        </a:xfrm>
+      </p:grpSpPr>
+      <p:sp>
+        <p:nvSpPr>
+          <p:cNvPr id="2" name="Espace réservé de l'image des diapositives 1"/>
+          <p:cNvSpPr>
+            <a:spLocks noGrp="1" noRot="1" noChangeAspect="1"/>
+          </p:cNvSpPr>
+          <p:nvPr>
+            <p:ph type="sldImg"/>
+          </p:nvPr>
+        </p:nvSpPr>
+        <p:spPr/>
+      </p:sp>
+      <p:sp>
+        <p:nvSpPr>
+          <p:cNvPr id="3" name="Espace réservé des notes 2"/>
+          <p:cNvSpPr>
+            <a:spLocks noGrp="1"/>
+          </p:cNvSpPr>
+          <p:nvPr>
+            <p:ph type="body" idx="1"/>
+          </p:nvPr>
+        </p:nvSpPr>
+        <p:spPr/>
+        <p:txBody>
+          <a:bodyPr/>
+          <a:lstStyle/>
+          <a:p>
+            <a:endParaRPr lang="en-US" dirty="0"/>
+          </a:p>
+        </p:txBody>
+      </p:sp>
+      <p:sp>
+        <p:nvSpPr>
+          <p:cNvPr id="4" name="Espace réservé du numéro de diapositive 3"/>
+          <p:cNvSpPr>
+            <a:spLocks noGrp="1"/>
+          </p:cNvSpPr>
+          <p:nvPr>
+            <p:ph type="sldNum" sz="quarter" idx="10"/>
+          </p:nvPr>
+        </p:nvSpPr>
+        <p:spPr/>
+        <p:txBody>
+          <a:bodyPr/>
+          <a:lstStyle/>
+          <a:p>
+            <a:fld id="{D7AD837A-E8ED-48A9-94F6-45C895234399}" type="slidenum">
+              <a:rPr lang="en-US" smtClean="0"/>
+              <a:t>5</a:t>
+            </a:fld>
+            <a:endParaRPr lang="en-US"/>
+          </a:p>
+        </p:txBody>
+      </p:sp>
+    </p:spTree>
+    <p:extLst>
+      <p:ext uri="{BB962C8B-B14F-4D97-AF65-F5344CB8AC3E}">
+        <p14:creationId xmlns:p14="http://schemas.microsoft.com/office/powerpoint/2010/main" val="4270796063"/>
+      </p:ext>
+    </p:extLst>
+  </p:cSld>
+  <p:clrMapOvr>
+    <a:masterClrMapping/>
+  </p:clrMapOvr>
+</p:notes>
+</file>
+
 <file path=ppt/slideLayouts/slideLayout1.xml><?xml version="1.0" encoding="utf-8"?>
 <p:sldLayout xmlns:a="http://schemas.openxmlformats.org/drawingml/2006/main" xmlns:r="http://schemas.openxmlformats.org/officeDocument/2006/relationships" xmlns:p="http://schemas.openxmlformats.org/presentationml/2006/main" type="title" preserve="1">
   <p:cSld name="Diapositive de titre">
@@ -698,7 +782,7 @@
           <a:p>
             <a:fld id="{8F770099-A425-4647-B315-6634FD7DE519}" type="datetimeFigureOut">
               <a:rPr lang="en-US" smtClean="0"/>
-              <a:t>6/12/2016</a:t>
+              <a:t>6/16/2016</a:t>
             </a:fld>
             <a:endParaRPr lang="en-US"/>
           </a:p>
@@ -868,7 +952,7 @@
           <a:p>
             <a:fld id="{8F770099-A425-4647-B315-6634FD7DE519}" type="datetimeFigureOut">
               <a:rPr lang="en-US" smtClean="0"/>
-              <a:t>6/12/2016</a:t>
+              <a:t>6/16/2016</a:t>
             </a:fld>
             <a:endParaRPr lang="en-US"/>
           </a:p>
@@ -1048,7 +1132,7 @@
           <a:p>
             <a:fld id="{8F770099-A425-4647-B315-6634FD7DE519}" type="datetimeFigureOut">
               <a:rPr lang="en-US" smtClean="0"/>
-              <a:t>6/12/2016</a:t>
+              <a:t>6/16/2016</a:t>
             </a:fld>
             <a:endParaRPr lang="en-US"/>
           </a:p>
@@ -1218,7 +1302,7 @@
           <a:p>
             <a:fld id="{8F770099-A425-4647-B315-6634FD7DE519}" type="datetimeFigureOut">
               <a:rPr lang="en-US" smtClean="0"/>
-              <a:t>6/12/2016</a:t>
+              <a:t>6/16/2016</a:t>
             </a:fld>
             <a:endParaRPr lang="en-US"/>
           </a:p>
@@ -1464,7 +1548,7 @@
           <a:p>
             <a:fld id="{8F770099-A425-4647-B315-6634FD7DE519}" type="datetimeFigureOut">
               <a:rPr lang="en-US" smtClean="0"/>
-              <a:t>6/12/2016</a:t>
+              <a:t>6/16/2016</a:t>
             </a:fld>
             <a:endParaRPr lang="en-US"/>
           </a:p>
@@ -1696,7 +1780,7 @@
           <a:p>
             <a:fld id="{8F770099-A425-4647-B315-6634FD7DE519}" type="datetimeFigureOut">
               <a:rPr lang="en-US" smtClean="0"/>
-              <a:t>6/12/2016</a:t>
+              <a:t>6/16/2016</a:t>
             </a:fld>
             <a:endParaRPr lang="en-US"/>
           </a:p>
@@ -2063,7 +2147,7 @@
           <a:p>
             <a:fld id="{8F770099-A425-4647-B315-6634FD7DE519}" type="datetimeFigureOut">
               <a:rPr lang="en-US" smtClean="0"/>
-              <a:t>6/12/2016</a:t>
+              <a:t>6/16/2016</a:t>
             </a:fld>
             <a:endParaRPr lang="en-US"/>
           </a:p>
@@ -2181,7 +2265,7 @@
           <a:p>
             <a:fld id="{8F770099-A425-4647-B315-6634FD7DE519}" type="datetimeFigureOut">
               <a:rPr lang="en-US" smtClean="0"/>
-              <a:t>6/12/2016</a:t>
+              <a:t>6/16/2016</a:t>
             </a:fld>
             <a:endParaRPr lang="en-US"/>
           </a:p>
@@ -2276,7 +2360,7 @@
           <a:p>
             <a:fld id="{8F770099-A425-4647-B315-6634FD7DE519}" type="datetimeFigureOut">
               <a:rPr lang="en-US" smtClean="0"/>
-              <a:t>6/12/2016</a:t>
+              <a:t>6/16/2016</a:t>
             </a:fld>
             <a:endParaRPr lang="en-US"/>
           </a:p>
@@ -2553,7 +2637,7 @@
           <a:p>
             <a:fld id="{8F770099-A425-4647-B315-6634FD7DE519}" type="datetimeFigureOut">
               <a:rPr lang="en-US" smtClean="0"/>
-              <a:t>6/12/2016</a:t>
+              <a:t>6/16/2016</a:t>
             </a:fld>
             <a:endParaRPr lang="en-US"/>
           </a:p>
@@ -2806,7 +2890,7 @@
           <a:p>
             <a:fld id="{8F770099-A425-4647-B315-6634FD7DE519}" type="datetimeFigureOut">
               <a:rPr lang="en-US" smtClean="0"/>
-              <a:t>6/12/2016</a:t>
+              <a:t>6/16/2016</a:t>
             </a:fld>
             <a:endParaRPr lang="en-US"/>
           </a:p>
@@ -3019,7 +3103,7 @@
           <a:p>
             <a:fld id="{8F770099-A425-4647-B315-6634FD7DE519}" type="datetimeFigureOut">
               <a:rPr lang="en-US" smtClean="0"/>
-              <a:t>6/12/2016</a:t>
+              <a:t>6/16/2016</a:t>
             </a:fld>
             <a:endParaRPr lang="en-US"/>
           </a:p>
@@ -3554,10 +3638,241 @@
           </a:p>
         </p:txBody>
       </p:sp>
+      <p:sp>
+        <p:nvSpPr>
+          <p:cNvPr id="2" name="ZoneTexte 1"/>
+          <p:cNvSpPr txBox="1"/>
+          <p:nvPr/>
+        </p:nvSpPr>
+        <p:spPr>
+          <a:xfrm>
+            <a:off x="789709" y="5957455"/>
+            <a:ext cx="1820819" cy="369332"/>
+          </a:xfrm>
+          <a:prstGeom prst="rect">
+            <a:avLst/>
+          </a:prstGeom>
+          <a:noFill/>
+        </p:spPr>
+        <p:txBody>
+          <a:bodyPr wrap="none" rtlCol="0">
+            <a:spAutoFit/>
+          </a:bodyPr>
+          <a:lstStyle/>
+          <a:p>
+            <a:r>
+              <a:rPr lang="fr-CH" dirty="0" smtClean="0"/>
+              <a:t>Quentin Salomon</a:t>
+            </a:r>
+            <a:endParaRPr lang="en-US" dirty="0"/>
+          </a:p>
+        </p:txBody>
+      </p:sp>
     </p:spTree>
     <p:extLst>
       <p:ext uri="{BB962C8B-B14F-4D97-AF65-F5344CB8AC3E}">
         <p14:creationId xmlns:p14="http://schemas.microsoft.com/office/powerpoint/2010/main" val="2017426899"/>
+      </p:ext>
+    </p:extLst>
+  </p:cSld>
+  <p:clrMapOvr>
+    <a:masterClrMapping/>
+  </p:clrMapOvr>
+  <p:timing>
+    <p:tnLst>
+      <p:par>
+        <p:cTn id="1" dur="indefinite" restart="never" nodeType="tmRoot"/>
+      </p:par>
+    </p:tnLst>
+  </p:timing>
+</p:sld>
+</file>
+
+<file path=ppt/slides/slide10.xml><?xml version="1.0" encoding="utf-8"?>
+<p:sld xmlns:a="http://schemas.openxmlformats.org/drawingml/2006/main" xmlns:r="http://schemas.openxmlformats.org/officeDocument/2006/relationships" xmlns:p="http://schemas.openxmlformats.org/presentationml/2006/main">
+  <p:cSld>
+    <p:spTree>
+      <p:nvGrpSpPr>
+        <p:cNvPr id="1" name=""/>
+        <p:cNvGrpSpPr/>
+        <p:nvPr/>
+      </p:nvGrpSpPr>
+      <p:grpSpPr>
+        <a:xfrm>
+          <a:off x="0" y="0"/>
+          <a:ext cx="0" cy="0"/>
+          <a:chOff x="0" y="0"/>
+          <a:chExt cx="0" cy="0"/>
+        </a:xfrm>
+      </p:grpSpPr>
+      <p:sp>
+        <p:nvSpPr>
+          <p:cNvPr id="3" name="Rectangle 2"/>
+          <p:cNvSpPr/>
+          <p:nvPr/>
+        </p:nvSpPr>
+        <p:spPr>
+          <a:xfrm>
+            <a:off x="0" y="1"/>
+            <a:ext cx="12192000" cy="1429470"/>
+          </a:xfrm>
+          <a:prstGeom prst="rect">
+            <a:avLst/>
+          </a:prstGeom>
+          <a:solidFill>
+            <a:srgbClr val="002060"/>
+          </a:solidFill>
+          <a:ln>
+            <a:noFill/>
+          </a:ln>
+        </p:spPr>
+        <p:style>
+          <a:lnRef idx="2">
+            <a:schemeClr val="accent1">
+              <a:shade val="50000"/>
+            </a:schemeClr>
+          </a:lnRef>
+          <a:fillRef idx="1">
+            <a:schemeClr val="accent1"/>
+          </a:fillRef>
+          <a:effectRef idx="0">
+            <a:schemeClr val="accent1"/>
+          </a:effectRef>
+          <a:fontRef idx="minor">
+            <a:schemeClr val="lt1"/>
+          </a:fontRef>
+        </p:style>
+        <p:txBody>
+          <a:bodyPr tIns="144000" rtlCol="0" anchor="t"/>
+          <a:lstStyle/>
+          <a:p>
+            <a:r>
+              <a:rPr lang="fr-CH" sz="4400" dirty="0" smtClean="0"/>
+              <a:t>Démonstration</a:t>
+            </a:r>
+            <a:endParaRPr lang="en-US" sz="4400" dirty="0"/>
+          </a:p>
+        </p:txBody>
+      </p:sp>
+      <p:sp>
+        <p:nvSpPr>
+          <p:cNvPr id="5" name="Rectangle 4"/>
+          <p:cNvSpPr/>
+          <p:nvPr/>
+        </p:nvSpPr>
+        <p:spPr>
+          <a:xfrm>
+            <a:off x="0" y="1411887"/>
+            <a:ext cx="12192000" cy="5428529"/>
+          </a:xfrm>
+          <a:prstGeom prst="rect">
+            <a:avLst/>
+          </a:prstGeom>
+          <a:solidFill>
+            <a:srgbClr val="080808">
+              <a:alpha val="20000"/>
+            </a:srgbClr>
+          </a:solidFill>
+          <a:ln>
+            <a:noFill/>
+          </a:ln>
+        </p:spPr>
+        <p:style>
+          <a:lnRef idx="2">
+            <a:schemeClr val="accent1">
+              <a:shade val="50000"/>
+            </a:schemeClr>
+          </a:lnRef>
+          <a:fillRef idx="1">
+            <a:schemeClr val="accent1"/>
+          </a:fillRef>
+          <a:effectRef idx="0">
+            <a:schemeClr val="accent1"/>
+          </a:effectRef>
+          <a:fontRef idx="minor">
+            <a:schemeClr val="lt1"/>
+          </a:fontRef>
+        </p:style>
+        <p:txBody>
+          <a:bodyPr rtlCol="0" anchor="ctr"/>
+          <a:lstStyle/>
+          <a:p>
+            <a:pPr algn="ctr"/>
+            <a:endParaRPr lang="en-US"/>
+          </a:p>
+        </p:txBody>
+      </p:sp>
+      <p:pic>
+        <p:nvPicPr>
+          <p:cNvPr id="6" name="Image 5"/>
+          <p:cNvPicPr>
+            <a:picLocks noChangeAspect="1"/>
+          </p:cNvPicPr>
+          <p:nvPr/>
+        </p:nvPicPr>
+        <p:blipFill>
+          <a:blip r:embed="rId2" cstate="print">
+            <a:extLst>
+              <a:ext uri="{28A0092B-C50C-407E-A947-70E740481C1C}">
+                <a14:useLocalDpi xmlns:a14="http://schemas.microsoft.com/office/drawing/2010/main" val="0"/>
+              </a:ext>
+            </a:extLst>
+          </a:blip>
+          <a:stretch>
+            <a:fillRect/>
+          </a:stretch>
+        </p:blipFill>
+        <p:spPr>
+          <a:xfrm>
+            <a:off x="10967188" y="196073"/>
+            <a:ext cx="1037325" cy="1037325"/>
+          </a:xfrm>
+          <a:prstGeom prst="rect">
+            <a:avLst/>
+          </a:prstGeom>
+        </p:spPr>
+      </p:pic>
+    </p:spTree>
+    <p:extLst>
+      <p:ext uri="{BB962C8B-B14F-4D97-AF65-F5344CB8AC3E}">
+        <p14:creationId xmlns:p14="http://schemas.microsoft.com/office/powerpoint/2010/main" val="2265459655"/>
+      </p:ext>
+    </p:extLst>
+  </p:cSld>
+  <p:clrMapOvr>
+    <a:masterClrMapping/>
+  </p:clrMapOvr>
+  <p:timing>
+    <p:tnLst>
+      <p:par>
+        <p:cTn id="1" dur="indefinite" restart="never" nodeType="tmRoot"/>
+      </p:par>
+    </p:tnLst>
+  </p:timing>
+</p:sld>
+</file>
+
+<file path=ppt/slides/slide11.xml><?xml version="1.0" encoding="utf-8"?>
+<p:sld xmlns:a="http://schemas.openxmlformats.org/drawingml/2006/main" xmlns:r="http://schemas.openxmlformats.org/officeDocument/2006/relationships" xmlns:p="http://schemas.openxmlformats.org/presentationml/2006/main">
+  <p:cSld>
+    <p:spTree>
+      <p:nvGrpSpPr>
+        <p:cNvPr id="1" name=""/>
+        <p:cNvGrpSpPr/>
+        <p:nvPr/>
+      </p:nvGrpSpPr>
+      <p:grpSpPr>
+        <a:xfrm>
+          <a:off x="0" y="0"/>
+          <a:ext cx="0" cy="0"/>
+          <a:chOff x="0" y="0"/>
+          <a:chExt cx="0" cy="0"/>
+        </a:xfrm>
+      </p:grpSpPr>
+    </p:spTree>
+    <p:extLst>
+      <p:ext uri="{BB962C8B-B14F-4D97-AF65-F5344CB8AC3E}">
+        <p14:creationId xmlns:p14="http://schemas.microsoft.com/office/powerpoint/2010/main" val="2491532387"/>
       </p:ext>
     </p:extLst>
   </p:cSld>
@@ -3593,178 +3908,64 @@
       </p:grpSpPr>
       <p:sp>
         <p:nvSpPr>
-          <p:cNvPr id="4" name="Rectangle 3"/>
-          <p:cNvSpPr/>
-          <p:nvPr/>
-        </p:nvSpPr>
-        <p:spPr>
-          <a:xfrm>
-            <a:off x="536334" y="659423"/>
-            <a:ext cx="3600000" cy="1440000"/>
-          </a:xfrm>
-          <a:prstGeom prst="rect">
-            <a:avLst/>
-          </a:prstGeom>
-          <a:solidFill>
-            <a:srgbClr val="1CA01C"/>
-          </a:solidFill>
-          <a:ln w="38100">
-            <a:noFill/>
-          </a:ln>
-        </p:spPr>
-        <p:style>
-          <a:lnRef idx="2">
-            <a:schemeClr val="accent1">
-              <a:shade val="50000"/>
-            </a:schemeClr>
-          </a:lnRef>
-          <a:fillRef idx="1">
-            <a:schemeClr val="accent1"/>
-          </a:fillRef>
-          <a:effectRef idx="0">
-            <a:schemeClr val="accent1"/>
-          </a:effectRef>
-          <a:fontRef idx="minor">
-            <a:schemeClr val="lt1"/>
-          </a:fontRef>
-        </p:style>
-        <p:txBody>
-          <a:bodyPr rtlCol="0" anchor="ctr"/>
-          <a:lstStyle/>
-          <a:p>
-            <a:pPr algn="ctr"/>
-            <a:r>
-              <a:rPr lang="fr-CH" sz="2800" dirty="0" smtClean="0">
-                <a:latin typeface="Times New Roman" panose="02020603050405020304" pitchFamily="18" charset="0"/>
-                <a:cs typeface="Times New Roman" panose="02020603050405020304" pitchFamily="18" charset="0"/>
-              </a:rPr>
-              <a:t>Un très large choix de partition</a:t>
-            </a:r>
-            <a:endParaRPr lang="en-US" sz="2800" dirty="0">
-              <a:latin typeface="Times New Roman" panose="02020603050405020304" pitchFamily="18" charset="0"/>
-              <a:cs typeface="Times New Roman" panose="02020603050405020304" pitchFamily="18" charset="0"/>
-            </a:endParaRPr>
-          </a:p>
-        </p:txBody>
-      </p:sp>
-      <p:sp>
-        <p:nvSpPr>
-          <p:cNvPr id="5" name="Rectangle 4"/>
-          <p:cNvSpPr/>
-          <p:nvPr/>
-        </p:nvSpPr>
-        <p:spPr>
-          <a:xfrm>
-            <a:off x="4362452" y="659423"/>
-            <a:ext cx="3600000" cy="1440000"/>
-          </a:xfrm>
-          <a:prstGeom prst="rect">
-            <a:avLst/>
-          </a:prstGeom>
-          <a:solidFill>
-            <a:schemeClr val="accent1">
-              <a:lumMod val="75000"/>
-            </a:schemeClr>
-          </a:solidFill>
-          <a:ln>
-            <a:noFill/>
-          </a:ln>
-        </p:spPr>
-        <p:style>
-          <a:lnRef idx="2">
-            <a:schemeClr val="accent1">
-              <a:shade val="50000"/>
-            </a:schemeClr>
-          </a:lnRef>
-          <a:fillRef idx="1">
-            <a:schemeClr val="accent1"/>
-          </a:fillRef>
-          <a:effectRef idx="0">
-            <a:schemeClr val="accent1"/>
-          </a:effectRef>
-          <a:fontRef idx="minor">
-            <a:schemeClr val="lt1"/>
-          </a:fontRef>
-        </p:style>
-        <p:txBody>
-          <a:bodyPr rtlCol="0" anchor="ctr"/>
-          <a:lstStyle/>
-          <a:p>
-            <a:pPr algn="ctr"/>
-            <a:r>
-              <a:rPr lang="fr-CH" sz="2800" dirty="0" smtClean="0">
-                <a:latin typeface="Times New Roman" panose="02020603050405020304" pitchFamily="18" charset="0"/>
-                <a:cs typeface="Times New Roman" panose="02020603050405020304" pitchFamily="18" charset="0"/>
-              </a:rPr>
-              <a:t>Une rapidité époustouflante</a:t>
-            </a:r>
-            <a:endParaRPr lang="en-US" sz="2800" dirty="0">
-              <a:latin typeface="Times New Roman" panose="02020603050405020304" pitchFamily="18" charset="0"/>
-              <a:cs typeface="Times New Roman" panose="02020603050405020304" pitchFamily="18" charset="0"/>
-            </a:endParaRPr>
-          </a:p>
-        </p:txBody>
-      </p:sp>
-      <p:sp>
-        <p:nvSpPr>
-          <p:cNvPr id="6" name="Rectangle 5"/>
-          <p:cNvSpPr/>
-          <p:nvPr/>
-        </p:nvSpPr>
-        <p:spPr>
-          <a:xfrm>
-            <a:off x="8188570" y="659423"/>
-            <a:ext cx="3600000" cy="1440000"/>
-          </a:xfrm>
-          <a:prstGeom prst="rect">
-            <a:avLst/>
-          </a:prstGeom>
-          <a:solidFill>
-            <a:srgbClr val="E09104"/>
-          </a:solidFill>
-          <a:ln>
-            <a:noFill/>
-          </a:ln>
-        </p:spPr>
-        <p:style>
-          <a:lnRef idx="2">
-            <a:schemeClr val="accent1">
-              <a:shade val="50000"/>
-            </a:schemeClr>
-          </a:lnRef>
-          <a:fillRef idx="1">
-            <a:schemeClr val="accent1"/>
-          </a:fillRef>
-          <a:effectRef idx="0">
-            <a:schemeClr val="accent1"/>
-          </a:effectRef>
-          <a:fontRef idx="minor">
-            <a:schemeClr val="lt1"/>
-          </a:fontRef>
-        </p:style>
-        <p:txBody>
-          <a:bodyPr rtlCol="0" anchor="ctr"/>
-          <a:lstStyle/>
-          <a:p>
-            <a:pPr algn="ctr"/>
-            <a:r>
-              <a:rPr lang="fr-CH" sz="2800" dirty="0" smtClean="0">
-                <a:latin typeface="Times New Roman" panose="02020603050405020304" pitchFamily="18" charset="0"/>
-                <a:cs typeface="Times New Roman" panose="02020603050405020304" pitchFamily="18" charset="0"/>
-              </a:rPr>
-              <a:t>Une qualité de musique incroyable</a:t>
-            </a:r>
-            <a:endParaRPr lang="en-US" sz="2800" dirty="0">
-              <a:latin typeface="Times New Roman" panose="02020603050405020304" pitchFamily="18" charset="0"/>
-              <a:cs typeface="Times New Roman" panose="02020603050405020304" pitchFamily="18" charset="0"/>
-            </a:endParaRPr>
+          <p:cNvPr id="2" name="Titre 1"/>
+          <p:cNvSpPr>
+            <a:spLocks noGrp="1"/>
+          </p:cNvSpPr>
+          <p:nvPr>
+            <p:ph type="title"/>
+          </p:nvPr>
+        </p:nvSpPr>
+        <p:spPr/>
+        <p:txBody>
+          <a:bodyPr/>
+          <a:lstStyle/>
+          <a:p>
+            <a:r>
+              <a:rPr lang="fr-CH" dirty="0" smtClean="0"/>
+              <a:t>Un déroulement </a:t>
+            </a:r>
+            <a:r>
+              <a:rPr lang="fr-CH" dirty="0" err="1" smtClean="0"/>
+              <a:t>passionant</a:t>
+            </a:r>
+            <a:endParaRPr lang="en-US" dirty="0"/>
+          </a:p>
+        </p:txBody>
+      </p:sp>
+      <p:sp>
+        <p:nvSpPr>
+          <p:cNvPr id="3" name="Espace réservé du contenu 2"/>
+          <p:cNvSpPr>
+            <a:spLocks noGrp="1"/>
+          </p:cNvSpPr>
+          <p:nvPr>
+            <p:ph idx="1"/>
+          </p:nvPr>
+        </p:nvSpPr>
+        <p:spPr/>
+        <p:txBody>
+          <a:bodyPr/>
+          <a:lstStyle/>
+          <a:p>
+            <a:r>
+              <a:rPr lang="fr-CH" dirty="0" smtClean="0"/>
+              <a:t>Objectifs : mariage d’art et de technologie</a:t>
+            </a:r>
+          </a:p>
+          <a:p>
+            <a:r>
+              <a:rPr lang="fr-CH" dirty="0" smtClean="0"/>
+              <a:t>Analyse d’un problème technique compliqué</a:t>
+            </a:r>
+            <a:endParaRPr lang="en-US" dirty="0"/>
           </a:p>
         </p:txBody>
       </p:sp>
     </p:spTree>
     <p:extLst>
       <p:ext uri="{BB962C8B-B14F-4D97-AF65-F5344CB8AC3E}">
-        <p14:creationId xmlns:p14="http://schemas.microsoft.com/office/powerpoint/2010/main" val="864811072"/>
+        <p14:creationId xmlns:p14="http://schemas.microsoft.com/office/powerpoint/2010/main" val="2991721739"/>
       </p:ext>
     </p:extLst>
   </p:cSld>
@@ -3800,20 +4001,22 @@
       </p:grpSpPr>
       <p:sp>
         <p:nvSpPr>
-          <p:cNvPr id="4" name="Rectangle 3"/>
+          <p:cNvPr id="15" name="Rectangle 14"/>
           <p:cNvSpPr/>
           <p:nvPr/>
         </p:nvSpPr>
         <p:spPr>
           <a:xfrm>
-            <a:off x="457204" y="2453054"/>
-            <a:ext cx="3600000" cy="1440000"/>
+            <a:off x="0" y="1429471"/>
+            <a:ext cx="12192000" cy="5428529"/>
           </a:xfrm>
           <a:prstGeom prst="rect">
             <a:avLst/>
           </a:prstGeom>
           <a:solidFill>
-            <a:srgbClr val="1CA01C"/>
+            <a:srgbClr val="080808">
+              <a:alpha val="20000"/>
+            </a:srgbClr>
           </a:solidFill>
           <a:ln>
             <a:noFill/>
@@ -3840,30 +4043,155 @@
           <a:lstStyle/>
           <a:p>
             <a:pPr algn="ctr"/>
+            <a:endParaRPr lang="en-US"/>
+          </a:p>
+        </p:txBody>
+      </p:sp>
+      <p:sp>
+        <p:nvSpPr>
+          <p:cNvPr id="6" name="Rectangle 5"/>
+          <p:cNvSpPr/>
+          <p:nvPr/>
+        </p:nvSpPr>
+        <p:spPr>
+          <a:xfrm>
+            <a:off x="0" y="1"/>
+            <a:ext cx="12192000" cy="1429470"/>
+          </a:xfrm>
+          <a:prstGeom prst="rect">
+            <a:avLst/>
+          </a:prstGeom>
+          <a:solidFill>
+            <a:srgbClr val="002060"/>
+          </a:solidFill>
+          <a:ln>
+            <a:noFill/>
+          </a:ln>
+        </p:spPr>
+        <p:style>
+          <a:lnRef idx="2">
+            <a:schemeClr val="accent1">
+              <a:shade val="50000"/>
+            </a:schemeClr>
+          </a:lnRef>
+          <a:fillRef idx="1">
+            <a:schemeClr val="accent1"/>
+          </a:fillRef>
+          <a:effectRef idx="0">
+            <a:schemeClr val="accent1"/>
+          </a:effectRef>
+          <a:fontRef idx="minor">
+            <a:schemeClr val="lt1"/>
+          </a:fontRef>
+        </p:style>
+        <p:txBody>
+          <a:bodyPr tIns="144000" rtlCol="0" anchor="t"/>
+          <a:lstStyle/>
+          <a:p>
+            <a:r>
+              <a:rPr lang="fr-CH" sz="4400" dirty="0" smtClean="0"/>
+              <a:t>Un xylophone atypique </a:t>
+            </a:r>
+            <a:endParaRPr lang="en-US" sz="4400" dirty="0"/>
+          </a:p>
+        </p:txBody>
+      </p:sp>
+      <p:pic>
+        <p:nvPicPr>
+          <p:cNvPr id="8" name="Image 7"/>
+          <p:cNvPicPr>
+            <a:picLocks noChangeAspect="1"/>
+          </p:cNvPicPr>
+          <p:nvPr/>
+        </p:nvPicPr>
+        <p:blipFill>
+          <a:blip r:embed="rId2">
+            <a:extLst>
+              <a:ext uri="{28A0092B-C50C-407E-A947-70E740481C1C}">
+                <a14:useLocalDpi xmlns:a14="http://schemas.microsoft.com/office/drawing/2010/main" val="0"/>
+              </a:ext>
+            </a:extLst>
+          </a:blip>
+          <a:stretch>
+            <a:fillRect/>
+          </a:stretch>
+        </p:blipFill>
+        <p:spPr>
+          <a:xfrm>
+            <a:off x="10867107" y="160180"/>
+            <a:ext cx="1109112" cy="1109112"/>
+          </a:xfrm>
+          <a:prstGeom prst="rect">
+            <a:avLst/>
+          </a:prstGeom>
+        </p:spPr>
+      </p:pic>
+      <p:sp>
+        <p:nvSpPr>
+          <p:cNvPr id="10" name="Rectangle 9"/>
+          <p:cNvSpPr/>
+          <p:nvPr/>
+        </p:nvSpPr>
+        <p:spPr>
+          <a:xfrm>
+            <a:off x="424297" y="1761976"/>
+            <a:ext cx="3600233" cy="1535139"/>
+          </a:xfrm>
+          <a:prstGeom prst="rect">
+            <a:avLst/>
+          </a:prstGeom>
+          <a:solidFill>
+            <a:srgbClr val="1CA01C"/>
+          </a:solidFill>
+          <a:ln w="38100">
+            <a:noFill/>
+          </a:ln>
+        </p:spPr>
+        <p:style>
+          <a:lnRef idx="2">
+            <a:schemeClr val="accent1">
+              <a:shade val="50000"/>
+            </a:schemeClr>
+          </a:lnRef>
+          <a:fillRef idx="1">
+            <a:schemeClr val="accent1"/>
+          </a:fillRef>
+          <a:effectRef idx="0">
+            <a:schemeClr val="accent1"/>
+          </a:effectRef>
+          <a:fontRef idx="minor">
+            <a:schemeClr val="lt1"/>
+          </a:fontRef>
+        </p:style>
+        <p:txBody>
+          <a:bodyPr rtlCol="0" anchor="b"/>
+          <a:lstStyle/>
+          <a:p>
+            <a:pPr algn="r"/>
             <a:r>
               <a:rPr lang="fr-CH" sz="2800" dirty="0" smtClean="0">
-                <a:latin typeface="Times New Roman" panose="02020603050405020304" pitchFamily="18" charset="0"/>
-                <a:cs typeface="Times New Roman" panose="02020603050405020304" pitchFamily="18" charset="0"/>
+                <a:latin typeface="Segoe UI Light" panose="020B0502040204020203" pitchFamily="34" charset="0"/>
+                <a:cs typeface="Segoe UI Light" panose="020B0502040204020203" pitchFamily="34" charset="0"/>
               </a:rPr>
-              <a:t>USB</a:t>
+              <a:t>Actuateurs</a:t>
             </a:r>
             <a:endParaRPr lang="en-US" sz="2800" dirty="0">
-              <a:latin typeface="Times New Roman" panose="02020603050405020304" pitchFamily="18" charset="0"/>
-              <a:cs typeface="Times New Roman" panose="02020603050405020304" pitchFamily="18" charset="0"/>
+              <a:latin typeface="Segoe UI Light" panose="020B0502040204020203" pitchFamily="34" charset="0"/>
+              <a:cs typeface="Segoe UI Light" panose="020B0502040204020203" pitchFamily="34" charset="0"/>
             </a:endParaRPr>
           </a:p>
         </p:txBody>
       </p:sp>
       <p:sp>
         <p:nvSpPr>
-          <p:cNvPr id="5" name="Rectangle 4"/>
+          <p:cNvPr id="11" name="Rectangle 10"/>
           <p:cNvSpPr/>
           <p:nvPr/>
         </p:nvSpPr>
         <p:spPr>
           <a:xfrm>
-            <a:off x="4283322" y="2453054"/>
-            <a:ext cx="3600000" cy="1440000"/>
+            <a:off x="4302319" y="1744580"/>
+            <a:ext cx="3600233" cy="1569929"/>
           </a:xfrm>
           <a:prstGeom prst="rect">
             <a:avLst/>
@@ -3894,34 +4222,34 @@
           </a:fontRef>
         </p:style>
         <p:txBody>
-          <a:bodyPr rtlCol="0" anchor="ctr"/>
-          <a:lstStyle/>
-          <a:p>
-            <a:pPr algn="ctr"/>
+          <a:bodyPr rtlCol="0" anchor="b"/>
+          <a:lstStyle/>
+          <a:p>
+            <a:pPr algn="r"/>
             <a:r>
               <a:rPr lang="fr-CH" sz="2800" dirty="0" smtClean="0">
-                <a:latin typeface="Times New Roman" panose="02020603050405020304" pitchFamily="18" charset="0"/>
-                <a:cs typeface="Times New Roman" panose="02020603050405020304" pitchFamily="18" charset="0"/>
+                <a:latin typeface="Segoe UI Light" panose="020B0502040204020203" pitchFamily="34" charset="0"/>
+                <a:cs typeface="Segoe UI Light" panose="020B0502040204020203" pitchFamily="34" charset="0"/>
               </a:rPr>
-              <a:t>I2C</a:t>
+              <a:t>Electronique</a:t>
             </a:r>
             <a:endParaRPr lang="en-US" sz="2800" dirty="0">
-              <a:latin typeface="Times New Roman" panose="02020603050405020304" pitchFamily="18" charset="0"/>
-              <a:cs typeface="Times New Roman" panose="02020603050405020304" pitchFamily="18" charset="0"/>
+              <a:latin typeface="Segoe UI Light" panose="020B0502040204020203" pitchFamily="34" charset="0"/>
+              <a:cs typeface="Segoe UI Light" panose="020B0502040204020203" pitchFamily="34" charset="0"/>
             </a:endParaRPr>
           </a:p>
         </p:txBody>
       </p:sp>
       <p:sp>
         <p:nvSpPr>
-          <p:cNvPr id="6" name="Rectangle 5"/>
+          <p:cNvPr id="12" name="Rectangle 11"/>
           <p:cNvSpPr/>
           <p:nvPr/>
         </p:nvSpPr>
         <p:spPr>
           <a:xfrm>
-            <a:off x="8109440" y="2453054"/>
-            <a:ext cx="3600000" cy="1440000"/>
+            <a:off x="8180342" y="1796765"/>
+            <a:ext cx="3600233" cy="1535140"/>
           </a:xfrm>
           <a:prstGeom prst="rect">
             <a:avLst/>
@@ -3950,84 +4278,118 @@
           </a:fontRef>
         </p:style>
         <p:txBody>
-          <a:bodyPr rtlCol="0" anchor="ctr"/>
-          <a:lstStyle/>
-          <a:p>
-            <a:pPr algn="ctr"/>
+          <a:bodyPr rtlCol="0" anchor="b"/>
+          <a:lstStyle/>
+          <a:p>
+            <a:pPr algn="r"/>
             <a:r>
               <a:rPr lang="fr-CH" sz="2800" dirty="0" smtClean="0">
-                <a:latin typeface="Times New Roman" panose="02020603050405020304" pitchFamily="18" charset="0"/>
-                <a:cs typeface="Times New Roman" panose="02020603050405020304" pitchFamily="18" charset="0"/>
+                <a:latin typeface="Segoe UI Light" panose="020B0502040204020203" pitchFamily="34" charset="0"/>
+                <a:cs typeface="Segoe UI Light" panose="020B0502040204020203" pitchFamily="34" charset="0"/>
               </a:rPr>
-              <a:t>WEB</a:t>
+              <a:t>Lumière</a:t>
             </a:r>
             <a:endParaRPr lang="en-US" sz="2800" dirty="0">
-              <a:latin typeface="Times New Roman" panose="02020603050405020304" pitchFamily="18" charset="0"/>
-              <a:cs typeface="Times New Roman" panose="02020603050405020304" pitchFamily="18" charset="0"/>
+              <a:latin typeface="Segoe UI Light" panose="020B0502040204020203" pitchFamily="34" charset="0"/>
+              <a:cs typeface="Segoe UI Light" panose="020B0502040204020203" pitchFamily="34" charset="0"/>
             </a:endParaRPr>
           </a:p>
         </p:txBody>
       </p:sp>
-      <p:sp>
-        <p:nvSpPr>
-          <p:cNvPr id="7" name="Rectangle 6"/>
-          <p:cNvSpPr/>
-          <p:nvPr/>
-        </p:nvSpPr>
-        <p:spPr>
-          <a:xfrm>
-            <a:off x="457204" y="486508"/>
-            <a:ext cx="11252236" cy="1729154"/>
+      <p:pic>
+        <p:nvPicPr>
+          <p:cNvPr id="2" name="Image 1"/>
+          <p:cNvPicPr>
+            <a:picLocks noChangeAspect="1"/>
+          </p:cNvPicPr>
+          <p:nvPr/>
+        </p:nvPicPr>
+        <p:blipFill>
+          <a:blip r:embed="rId3">
+            <a:extLst>
+              <a:ext uri="{28A0092B-C50C-407E-A947-70E740481C1C}">
+                <a14:useLocalDpi xmlns:a14="http://schemas.microsoft.com/office/drawing/2010/main" val="0"/>
+              </a:ext>
+            </a:extLst>
+          </a:blip>
+          <a:stretch>
+            <a:fillRect/>
+          </a:stretch>
+        </p:blipFill>
+        <p:spPr>
+          <a:xfrm>
+            <a:off x="648717" y="1906547"/>
+            <a:ext cx="810057" cy="810057"/>
           </a:xfrm>
           <a:prstGeom prst="rect">
             <a:avLst/>
           </a:prstGeom>
-          <a:solidFill>
-            <a:srgbClr val="EF7057"/>
-          </a:solidFill>
-          <a:ln>
-            <a:noFill/>
-          </a:ln>
-        </p:spPr>
-        <p:style>
-          <a:lnRef idx="2">
-            <a:schemeClr val="accent1">
-              <a:shade val="50000"/>
-            </a:schemeClr>
-          </a:lnRef>
-          <a:fillRef idx="1">
-            <a:schemeClr val="accent1"/>
-          </a:fillRef>
-          <a:effectRef idx="0">
-            <a:schemeClr val="accent1"/>
-          </a:effectRef>
-          <a:fontRef idx="minor">
-            <a:schemeClr val="lt1"/>
-          </a:fontRef>
-        </p:style>
-        <p:txBody>
-          <a:bodyPr rtlCol="0" anchor="ctr"/>
-          <a:lstStyle/>
-          <a:p>
-            <a:pPr algn="ctr"/>
-            <a:r>
-              <a:rPr lang="fr-CH" sz="2800" dirty="0" smtClean="0">
-                <a:latin typeface="Times New Roman" panose="02020603050405020304" pitchFamily="18" charset="0"/>
-                <a:cs typeface="Times New Roman" panose="02020603050405020304" pitchFamily="18" charset="0"/>
-              </a:rPr>
-              <a:t>Communication</a:t>
-            </a:r>
-            <a:endParaRPr lang="en-US" sz="2800" dirty="0">
-              <a:latin typeface="Times New Roman" panose="02020603050405020304" pitchFamily="18" charset="0"/>
-              <a:cs typeface="Times New Roman" panose="02020603050405020304" pitchFamily="18" charset="0"/>
-            </a:endParaRPr>
-          </a:p>
-        </p:txBody>
-      </p:sp>
+        </p:spPr>
+      </p:pic>
+      <p:pic>
+        <p:nvPicPr>
+          <p:cNvPr id="3" name="Image 2"/>
+          <p:cNvPicPr>
+            <a:picLocks noChangeAspect="1"/>
+          </p:cNvPicPr>
+          <p:nvPr/>
+        </p:nvPicPr>
+        <p:blipFill>
+          <a:blip r:embed="rId4">
+            <a:extLst>
+              <a:ext uri="{28A0092B-C50C-407E-A947-70E740481C1C}">
+                <a14:useLocalDpi xmlns:a14="http://schemas.microsoft.com/office/drawing/2010/main" val="0"/>
+              </a:ext>
+            </a:extLst>
+          </a:blip>
+          <a:stretch>
+            <a:fillRect/>
+          </a:stretch>
+        </p:blipFill>
+        <p:spPr>
+          <a:xfrm>
+            <a:off x="8277395" y="1906362"/>
+            <a:ext cx="808415" cy="808415"/>
+          </a:xfrm>
+          <a:prstGeom prst="rect">
+            <a:avLst/>
+          </a:prstGeom>
+        </p:spPr>
+      </p:pic>
+      <p:pic>
+        <p:nvPicPr>
+          <p:cNvPr id="4" name="Image 3"/>
+          <p:cNvPicPr>
+            <a:picLocks noChangeAspect="1"/>
+          </p:cNvPicPr>
+          <p:nvPr/>
+        </p:nvPicPr>
+        <p:blipFill>
+          <a:blip r:embed="rId5">
+            <a:extLst>
+              <a:ext uri="{28A0092B-C50C-407E-A947-70E740481C1C}">
+                <a14:useLocalDpi xmlns:a14="http://schemas.microsoft.com/office/drawing/2010/main" val="0"/>
+              </a:ext>
+            </a:extLst>
+          </a:blip>
+          <a:stretch>
+            <a:fillRect/>
+          </a:stretch>
+        </p:blipFill>
+        <p:spPr>
+          <a:xfrm>
+            <a:off x="4515630" y="1906362"/>
+            <a:ext cx="812828" cy="812828"/>
+          </a:xfrm>
+          <a:prstGeom prst="rect">
+            <a:avLst/>
+          </a:prstGeom>
+        </p:spPr>
+      </p:pic>
     </p:spTree>
     <p:extLst>
       <p:ext uri="{BB962C8B-B14F-4D97-AF65-F5344CB8AC3E}">
-        <p14:creationId xmlns:p14="http://schemas.microsoft.com/office/powerpoint/2010/main" val="784479314"/>
+        <p14:creationId xmlns:p14="http://schemas.microsoft.com/office/powerpoint/2010/main" val="4065108536"/>
       </p:ext>
     </p:extLst>
   </p:cSld>
@@ -4063,20 +4425,22 @@
       </p:grpSpPr>
       <p:sp>
         <p:nvSpPr>
-          <p:cNvPr id="10" name="Rectangle 9"/>
+          <p:cNvPr id="15" name="Rectangle 14"/>
           <p:cNvSpPr/>
           <p:nvPr/>
         </p:nvSpPr>
         <p:spPr>
           <a:xfrm>
-            <a:off x="469882" y="381000"/>
-            <a:ext cx="11252236" cy="1729154"/>
+            <a:off x="0" y="1429471"/>
+            <a:ext cx="12192000" cy="5428529"/>
           </a:xfrm>
           <a:prstGeom prst="rect">
             <a:avLst/>
           </a:prstGeom>
           <a:solidFill>
-            <a:srgbClr val="1CA01C"/>
+            <a:srgbClr val="080808">
+              <a:alpha val="20000"/>
+            </a:srgbClr>
           </a:solidFill>
           <a:ln>
             <a:noFill/>
@@ -4103,24 +4467,737 @@
           <a:lstStyle/>
           <a:p>
             <a:pPr algn="ctr"/>
-            <a:r>
-              <a:rPr lang="fr-CH" sz="2800" dirty="0" smtClean="0">
-                <a:latin typeface="Times New Roman" panose="02020603050405020304" pitchFamily="18" charset="0"/>
-                <a:cs typeface="Times New Roman" panose="02020603050405020304" pitchFamily="18" charset="0"/>
+            <a:endParaRPr lang="en-US"/>
+          </a:p>
+        </p:txBody>
+      </p:sp>
+      <p:sp>
+        <p:nvSpPr>
+          <p:cNvPr id="6" name="Rectangle 5"/>
+          <p:cNvSpPr/>
+          <p:nvPr/>
+        </p:nvSpPr>
+        <p:spPr>
+          <a:xfrm>
+            <a:off x="0" y="1"/>
+            <a:ext cx="12192000" cy="1429470"/>
+          </a:xfrm>
+          <a:prstGeom prst="rect">
+            <a:avLst/>
+          </a:prstGeom>
+          <a:solidFill>
+            <a:srgbClr val="002060"/>
+          </a:solidFill>
+          <a:ln>
+            <a:noFill/>
+          </a:ln>
+        </p:spPr>
+        <p:style>
+          <a:lnRef idx="2">
+            <a:schemeClr val="accent1">
+              <a:shade val="50000"/>
+            </a:schemeClr>
+          </a:lnRef>
+          <a:fillRef idx="1">
+            <a:schemeClr val="accent1"/>
+          </a:fillRef>
+          <a:effectRef idx="0">
+            <a:schemeClr val="accent1"/>
+          </a:effectRef>
+          <a:fontRef idx="minor">
+            <a:schemeClr val="lt1"/>
+          </a:fontRef>
+        </p:style>
+        <p:txBody>
+          <a:bodyPr tIns="144000" rtlCol="0" anchor="t"/>
+          <a:lstStyle/>
+          <a:p>
+            <a:r>
+              <a:rPr lang="fr-CH" sz="4400" dirty="0" smtClean="0"/>
+              <a:t>Un xylophone atypique </a:t>
+            </a:r>
+            <a:endParaRPr lang="en-US" sz="4400" dirty="0"/>
+          </a:p>
+        </p:txBody>
+      </p:sp>
+      <p:pic>
+        <p:nvPicPr>
+          <p:cNvPr id="8" name="Image 7"/>
+          <p:cNvPicPr>
+            <a:picLocks noChangeAspect="1"/>
+          </p:cNvPicPr>
+          <p:nvPr/>
+        </p:nvPicPr>
+        <p:blipFill>
+          <a:blip r:embed="rId2">
+            <a:extLst>
+              <a:ext uri="{28A0092B-C50C-407E-A947-70E740481C1C}">
+                <a14:useLocalDpi xmlns:a14="http://schemas.microsoft.com/office/drawing/2010/main" val="0"/>
+              </a:ext>
+            </a:extLst>
+          </a:blip>
+          <a:stretch>
+            <a:fillRect/>
+          </a:stretch>
+        </p:blipFill>
+        <p:spPr>
+          <a:xfrm>
+            <a:off x="10867107" y="160180"/>
+            <a:ext cx="1109112" cy="1109112"/>
+          </a:xfrm>
+          <a:prstGeom prst="rect">
+            <a:avLst/>
+          </a:prstGeom>
+        </p:spPr>
+      </p:pic>
+      <p:sp>
+        <p:nvSpPr>
+          <p:cNvPr id="10" name="Rectangle 9"/>
+          <p:cNvSpPr/>
+          <p:nvPr/>
+        </p:nvSpPr>
+        <p:spPr>
+          <a:xfrm>
+            <a:off x="290661" y="1744580"/>
+            <a:ext cx="3600233" cy="4904832"/>
+          </a:xfrm>
+          <a:prstGeom prst="rect">
+            <a:avLst/>
+          </a:prstGeom>
+          <a:solidFill>
+            <a:srgbClr val="1CA01C"/>
+          </a:solidFill>
+          <a:ln w="38100">
+            <a:noFill/>
+          </a:ln>
+        </p:spPr>
+        <p:style>
+          <a:lnRef idx="2">
+            <a:schemeClr val="accent1">
+              <a:shade val="50000"/>
+            </a:schemeClr>
+          </a:lnRef>
+          <a:fillRef idx="1">
+            <a:schemeClr val="accent1"/>
+          </a:fillRef>
+          <a:effectRef idx="0">
+            <a:schemeClr val="accent1"/>
+          </a:effectRef>
+          <a:fontRef idx="minor">
+            <a:schemeClr val="lt1"/>
+          </a:fontRef>
+        </p:style>
+        <p:txBody>
+          <a:bodyPr rtlCol="0" anchor="b"/>
+          <a:lstStyle/>
+          <a:p>
+            <a:pPr algn="r"/>
+            <a:endParaRPr lang="en-US" sz="2800" dirty="0">
+              <a:latin typeface="Segoe UI Light" panose="020B0502040204020203" pitchFamily="34" charset="0"/>
+              <a:cs typeface="Segoe UI Light" panose="020B0502040204020203" pitchFamily="34" charset="0"/>
+            </a:endParaRPr>
+          </a:p>
+        </p:txBody>
+      </p:sp>
+      <p:sp>
+        <p:nvSpPr>
+          <p:cNvPr id="11" name="Rectangle 10"/>
+          <p:cNvSpPr/>
+          <p:nvPr/>
+        </p:nvSpPr>
+        <p:spPr>
+          <a:xfrm>
+            <a:off x="4302319" y="1744580"/>
+            <a:ext cx="3600233" cy="4904832"/>
+          </a:xfrm>
+          <a:prstGeom prst="rect">
+            <a:avLst/>
+          </a:prstGeom>
+          <a:solidFill>
+            <a:schemeClr val="accent1">
+              <a:lumMod val="75000"/>
+            </a:schemeClr>
+          </a:solidFill>
+          <a:ln>
+            <a:noFill/>
+          </a:ln>
+        </p:spPr>
+        <p:style>
+          <a:lnRef idx="2">
+            <a:schemeClr val="accent1">
+              <a:shade val="50000"/>
+            </a:schemeClr>
+          </a:lnRef>
+          <a:fillRef idx="1">
+            <a:schemeClr val="accent1"/>
+          </a:fillRef>
+          <a:effectRef idx="0">
+            <a:schemeClr val="accent1"/>
+          </a:effectRef>
+          <a:fontRef idx="minor">
+            <a:schemeClr val="lt1"/>
+          </a:fontRef>
+        </p:style>
+        <p:txBody>
+          <a:bodyPr rtlCol="0" anchor="b"/>
+          <a:lstStyle/>
+          <a:p>
+            <a:pPr algn="r"/>
+            <a:endParaRPr lang="en-US" sz="2800" dirty="0">
+              <a:latin typeface="Segoe UI Light" panose="020B0502040204020203" pitchFamily="34" charset="0"/>
+              <a:cs typeface="Segoe UI Light" panose="020B0502040204020203" pitchFamily="34" charset="0"/>
+            </a:endParaRPr>
+          </a:p>
+        </p:txBody>
+      </p:sp>
+      <p:sp>
+        <p:nvSpPr>
+          <p:cNvPr id="12" name="Rectangle 11"/>
+          <p:cNvSpPr/>
+          <p:nvPr/>
+        </p:nvSpPr>
+        <p:spPr>
+          <a:xfrm>
+            <a:off x="8247096" y="1747056"/>
+            <a:ext cx="3600233" cy="4902356"/>
+          </a:xfrm>
+          <a:prstGeom prst="rect">
+            <a:avLst/>
+          </a:prstGeom>
+          <a:solidFill>
+            <a:srgbClr val="7030A0"/>
+          </a:solidFill>
+          <a:ln>
+            <a:noFill/>
+          </a:ln>
+        </p:spPr>
+        <p:style>
+          <a:lnRef idx="2">
+            <a:schemeClr val="accent1">
+              <a:shade val="50000"/>
+            </a:schemeClr>
+          </a:lnRef>
+          <a:fillRef idx="1">
+            <a:schemeClr val="accent1"/>
+          </a:fillRef>
+          <a:effectRef idx="0">
+            <a:schemeClr val="accent1"/>
+          </a:effectRef>
+          <a:fontRef idx="minor">
+            <a:schemeClr val="lt1"/>
+          </a:fontRef>
+        </p:style>
+        <p:txBody>
+          <a:bodyPr rtlCol="0" anchor="b"/>
+          <a:lstStyle/>
+          <a:p>
+            <a:pPr algn="r"/>
+            <a:endParaRPr lang="en-US" sz="2800" dirty="0">
+              <a:latin typeface="Segoe UI Light" panose="020B0502040204020203" pitchFamily="34" charset="0"/>
+              <a:cs typeface="Segoe UI Light" panose="020B0502040204020203" pitchFamily="34" charset="0"/>
+            </a:endParaRPr>
+          </a:p>
+        </p:txBody>
+      </p:sp>
+      <p:pic>
+        <p:nvPicPr>
+          <p:cNvPr id="2" name="Image 1"/>
+          <p:cNvPicPr>
+            <a:picLocks noChangeAspect="1"/>
+          </p:cNvPicPr>
+          <p:nvPr/>
+        </p:nvPicPr>
+        <p:blipFill>
+          <a:blip r:embed="rId3">
+            <a:extLst>
+              <a:ext uri="{28A0092B-C50C-407E-A947-70E740481C1C}">
+                <a14:useLocalDpi xmlns:a14="http://schemas.microsoft.com/office/drawing/2010/main" val="0"/>
+              </a:ext>
+            </a:extLst>
+          </a:blip>
+          <a:stretch>
+            <a:fillRect/>
+          </a:stretch>
+        </p:blipFill>
+        <p:spPr>
+          <a:xfrm>
+            <a:off x="1685748" y="2362287"/>
+            <a:ext cx="810057" cy="810057"/>
+          </a:xfrm>
+          <a:prstGeom prst="rect">
+            <a:avLst/>
+          </a:prstGeom>
+        </p:spPr>
+      </p:pic>
+      <p:pic>
+        <p:nvPicPr>
+          <p:cNvPr id="3" name="Image 2"/>
+          <p:cNvPicPr>
+            <a:picLocks noChangeAspect="1"/>
+          </p:cNvPicPr>
+          <p:nvPr/>
+        </p:nvPicPr>
+        <p:blipFill>
+          <a:blip r:embed="rId4">
+            <a:extLst>
+              <a:ext uri="{28A0092B-C50C-407E-A947-70E740481C1C}">
+                <a14:useLocalDpi xmlns:a14="http://schemas.microsoft.com/office/drawing/2010/main" val="0"/>
+              </a:ext>
+            </a:extLst>
+          </a:blip>
+          <a:stretch>
+            <a:fillRect/>
+          </a:stretch>
+        </p:blipFill>
+        <p:spPr>
+          <a:xfrm>
+            <a:off x="9643004" y="2362287"/>
+            <a:ext cx="808415" cy="808415"/>
+          </a:xfrm>
+          <a:prstGeom prst="rect">
+            <a:avLst/>
+          </a:prstGeom>
+        </p:spPr>
+      </p:pic>
+      <p:pic>
+        <p:nvPicPr>
+          <p:cNvPr id="4" name="Image 3"/>
+          <p:cNvPicPr>
+            <a:picLocks noChangeAspect="1"/>
+          </p:cNvPicPr>
+          <p:nvPr/>
+        </p:nvPicPr>
+        <p:blipFill>
+          <a:blip r:embed="rId5">
+            <a:extLst>
+              <a:ext uri="{28A0092B-C50C-407E-A947-70E740481C1C}">
+                <a14:useLocalDpi xmlns:a14="http://schemas.microsoft.com/office/drawing/2010/main" val="0"/>
+              </a:ext>
+            </a:extLst>
+          </a:blip>
+          <a:stretch>
+            <a:fillRect/>
+          </a:stretch>
+        </p:blipFill>
+        <p:spPr>
+          <a:xfrm>
+            <a:off x="5689586" y="2362287"/>
+            <a:ext cx="812828" cy="812828"/>
+          </a:xfrm>
+          <a:prstGeom prst="rect">
+            <a:avLst/>
+          </a:prstGeom>
+        </p:spPr>
+      </p:pic>
+      <p:sp>
+        <p:nvSpPr>
+          <p:cNvPr id="16" name="Ellipse 15"/>
+          <p:cNvSpPr/>
+          <p:nvPr/>
+        </p:nvSpPr>
+        <p:spPr>
+          <a:xfrm>
+            <a:off x="1370777" y="2060818"/>
+            <a:ext cx="1440000" cy="1440000"/>
+          </a:xfrm>
+          <a:prstGeom prst="ellipse">
+            <a:avLst/>
+          </a:prstGeom>
+          <a:noFill/>
+          <a:ln>
+            <a:solidFill>
+              <a:schemeClr val="bg1"/>
+            </a:solidFill>
+          </a:ln>
+        </p:spPr>
+        <p:style>
+          <a:lnRef idx="2">
+            <a:schemeClr val="accent1">
+              <a:shade val="50000"/>
+            </a:schemeClr>
+          </a:lnRef>
+          <a:fillRef idx="1">
+            <a:schemeClr val="accent1"/>
+          </a:fillRef>
+          <a:effectRef idx="0">
+            <a:schemeClr val="accent1"/>
+          </a:effectRef>
+          <a:fontRef idx="minor">
+            <a:schemeClr val="lt1"/>
+          </a:fontRef>
+        </p:style>
+        <p:txBody>
+          <a:bodyPr rtlCol="0" anchor="ctr"/>
+          <a:lstStyle/>
+          <a:p>
+            <a:pPr algn="ctr"/>
+            <a:endParaRPr lang="en-US"/>
+          </a:p>
+        </p:txBody>
+      </p:sp>
+      <p:sp>
+        <p:nvSpPr>
+          <p:cNvPr id="17" name="Ellipse 16"/>
+          <p:cNvSpPr/>
+          <p:nvPr/>
+        </p:nvSpPr>
+        <p:spPr>
+          <a:xfrm>
+            <a:off x="9327212" y="2070120"/>
+            <a:ext cx="1440000" cy="1440000"/>
+          </a:xfrm>
+          <a:prstGeom prst="ellipse">
+            <a:avLst/>
+          </a:prstGeom>
+          <a:noFill/>
+          <a:ln>
+            <a:solidFill>
+              <a:schemeClr val="bg1"/>
+            </a:solidFill>
+          </a:ln>
+        </p:spPr>
+        <p:style>
+          <a:lnRef idx="2">
+            <a:schemeClr val="accent1">
+              <a:shade val="50000"/>
+            </a:schemeClr>
+          </a:lnRef>
+          <a:fillRef idx="1">
+            <a:schemeClr val="accent1"/>
+          </a:fillRef>
+          <a:effectRef idx="0">
+            <a:schemeClr val="accent1"/>
+          </a:effectRef>
+          <a:fontRef idx="minor">
+            <a:schemeClr val="lt1"/>
+          </a:fontRef>
+        </p:style>
+        <p:txBody>
+          <a:bodyPr rtlCol="0" anchor="ctr"/>
+          <a:lstStyle/>
+          <a:p>
+            <a:pPr algn="ctr"/>
+            <a:endParaRPr lang="en-US"/>
+          </a:p>
+        </p:txBody>
+      </p:sp>
+      <p:sp>
+        <p:nvSpPr>
+          <p:cNvPr id="18" name="Ellipse 17"/>
+          <p:cNvSpPr/>
+          <p:nvPr/>
+        </p:nvSpPr>
+        <p:spPr>
+          <a:xfrm>
+            <a:off x="5376000" y="2070120"/>
+            <a:ext cx="1440000" cy="1440000"/>
+          </a:xfrm>
+          <a:prstGeom prst="ellipse">
+            <a:avLst/>
+          </a:prstGeom>
+          <a:noFill/>
+          <a:ln>
+            <a:solidFill>
+              <a:schemeClr val="bg1"/>
+            </a:solidFill>
+          </a:ln>
+        </p:spPr>
+        <p:style>
+          <a:lnRef idx="2">
+            <a:schemeClr val="accent1">
+              <a:shade val="50000"/>
+            </a:schemeClr>
+          </a:lnRef>
+          <a:fillRef idx="1">
+            <a:schemeClr val="accent1"/>
+          </a:fillRef>
+          <a:effectRef idx="0">
+            <a:schemeClr val="accent1"/>
+          </a:effectRef>
+          <a:fontRef idx="minor">
+            <a:schemeClr val="lt1"/>
+          </a:fontRef>
+        </p:style>
+        <p:txBody>
+          <a:bodyPr rtlCol="0" anchor="ctr"/>
+          <a:lstStyle/>
+          <a:p>
+            <a:pPr algn="ctr"/>
+            <a:endParaRPr lang="en-US"/>
+          </a:p>
+        </p:txBody>
+      </p:sp>
+      <p:sp>
+        <p:nvSpPr>
+          <p:cNvPr id="19" name="ZoneTexte 18"/>
+          <p:cNvSpPr txBox="1"/>
+          <p:nvPr/>
+        </p:nvSpPr>
+        <p:spPr>
+          <a:xfrm>
+            <a:off x="568981" y="3759517"/>
+            <a:ext cx="3043589" cy="523220"/>
+          </a:xfrm>
+          <a:prstGeom prst="rect">
+            <a:avLst/>
+          </a:prstGeom>
+          <a:noFill/>
+        </p:spPr>
+        <p:txBody>
+          <a:bodyPr wrap="square" rtlCol="0">
+            <a:spAutoFit/>
+          </a:bodyPr>
+          <a:lstStyle/>
+          <a:p>
+            <a:pPr algn="ctr"/>
+            <a:r>
+              <a:rPr lang="fr-CH" sz="2800" dirty="0">
+                <a:solidFill>
+                  <a:schemeClr val="bg1"/>
+                </a:solidFill>
+                <a:latin typeface="Segoe UI Light" panose="020B0502040204020203" pitchFamily="34" charset="0"/>
+                <a:cs typeface="Segoe UI Light" panose="020B0502040204020203" pitchFamily="34" charset="0"/>
               </a:rPr>
-              <a:t>Architecture UML</a:t>
-            </a:r>
-            <a:endParaRPr lang="en-US" sz="2800" dirty="0">
-              <a:latin typeface="Times New Roman" panose="02020603050405020304" pitchFamily="18" charset="0"/>
-              <a:cs typeface="Times New Roman" panose="02020603050405020304" pitchFamily="18" charset="0"/>
+              <a:t>Actuateurs</a:t>
+            </a:r>
+            <a:endParaRPr lang="en-US" sz="2800" b="1" dirty="0">
+              <a:solidFill>
+                <a:schemeClr val="bg1"/>
+              </a:solidFill>
+              <a:latin typeface="Segoe UI Light" panose="020B0502040204020203" pitchFamily="34" charset="0"/>
+              <a:cs typeface="Segoe UI Light" panose="020B0502040204020203" pitchFamily="34" charset="0"/>
             </a:endParaRPr>
+          </a:p>
+        </p:txBody>
+      </p:sp>
+      <p:sp>
+        <p:nvSpPr>
+          <p:cNvPr id="20" name="ZoneTexte 19"/>
+          <p:cNvSpPr txBox="1"/>
+          <p:nvPr/>
+        </p:nvSpPr>
+        <p:spPr>
+          <a:xfrm>
+            <a:off x="4854545" y="3759517"/>
+            <a:ext cx="2482910" cy="523220"/>
+          </a:xfrm>
+          <a:prstGeom prst="rect">
+            <a:avLst/>
+          </a:prstGeom>
+          <a:noFill/>
+        </p:spPr>
+        <p:txBody>
+          <a:bodyPr wrap="square" rtlCol="0">
+            <a:spAutoFit/>
+          </a:bodyPr>
+          <a:lstStyle/>
+          <a:p>
+            <a:pPr algn="ctr"/>
+            <a:r>
+              <a:rPr lang="fr-CH" sz="2800" dirty="0">
+                <a:solidFill>
+                  <a:schemeClr val="bg1"/>
+                </a:solidFill>
+                <a:latin typeface="Segoe UI Light" panose="020B0502040204020203" pitchFamily="34" charset="0"/>
+                <a:cs typeface="Segoe UI Light" panose="020B0502040204020203" pitchFamily="34" charset="0"/>
+              </a:rPr>
+              <a:t>Electronique</a:t>
+            </a:r>
+            <a:endParaRPr lang="en-US" sz="2800" b="1" dirty="0">
+              <a:solidFill>
+                <a:schemeClr val="bg1"/>
+              </a:solidFill>
+              <a:latin typeface="Segoe UI Light" panose="020B0502040204020203" pitchFamily="34" charset="0"/>
+              <a:cs typeface="Segoe UI Light" panose="020B0502040204020203" pitchFamily="34" charset="0"/>
+            </a:endParaRPr>
+          </a:p>
+        </p:txBody>
+      </p:sp>
+      <p:sp>
+        <p:nvSpPr>
+          <p:cNvPr id="21" name="ZoneTexte 20"/>
+          <p:cNvSpPr txBox="1"/>
+          <p:nvPr/>
+        </p:nvSpPr>
+        <p:spPr>
+          <a:xfrm>
+            <a:off x="8501141" y="3747300"/>
+            <a:ext cx="3087556" cy="523220"/>
+          </a:xfrm>
+          <a:prstGeom prst="rect">
+            <a:avLst/>
+          </a:prstGeom>
+          <a:noFill/>
+        </p:spPr>
+        <p:txBody>
+          <a:bodyPr wrap="square" rtlCol="0">
+            <a:spAutoFit/>
+          </a:bodyPr>
+          <a:lstStyle/>
+          <a:p>
+            <a:pPr algn="ctr"/>
+            <a:r>
+              <a:rPr lang="fr-CH" sz="2800" dirty="0">
+                <a:solidFill>
+                  <a:schemeClr val="bg1"/>
+                </a:solidFill>
+                <a:latin typeface="Segoe UI Light" panose="020B0502040204020203" pitchFamily="34" charset="0"/>
+                <a:cs typeface="Segoe UI Light" panose="020B0502040204020203" pitchFamily="34" charset="0"/>
+              </a:rPr>
+              <a:t>Lumière</a:t>
+            </a:r>
+            <a:endParaRPr lang="en-US" sz="2800" b="1" dirty="0">
+              <a:solidFill>
+                <a:schemeClr val="bg1"/>
+              </a:solidFill>
+              <a:latin typeface="Segoe UI Light" panose="020B0502040204020203" pitchFamily="34" charset="0"/>
+              <a:cs typeface="Segoe UI Light" panose="020B0502040204020203" pitchFamily="34" charset="0"/>
+            </a:endParaRPr>
+          </a:p>
+        </p:txBody>
+      </p:sp>
+      <p:sp>
+        <p:nvSpPr>
+          <p:cNvPr id="22" name="Triangle isocèle 21"/>
+          <p:cNvSpPr/>
+          <p:nvPr/>
+        </p:nvSpPr>
+        <p:spPr>
+          <a:xfrm flipV="1">
+            <a:off x="5996235" y="3500818"/>
+            <a:ext cx="212400" cy="244800"/>
+          </a:xfrm>
+          <a:prstGeom prst="triangle">
+            <a:avLst/>
+          </a:prstGeom>
+          <a:solidFill>
+            <a:srgbClr val="FFC000"/>
+          </a:solidFill>
+          <a:ln>
+            <a:noFill/>
+          </a:ln>
+        </p:spPr>
+        <p:style>
+          <a:lnRef idx="2">
+            <a:schemeClr val="accent1">
+              <a:shade val="50000"/>
+            </a:schemeClr>
+          </a:lnRef>
+          <a:fillRef idx="1">
+            <a:schemeClr val="accent1"/>
+          </a:fillRef>
+          <a:effectRef idx="0">
+            <a:schemeClr val="accent1"/>
+          </a:effectRef>
+          <a:fontRef idx="minor">
+            <a:schemeClr val="lt1"/>
+          </a:fontRef>
+        </p:style>
+        <p:txBody>
+          <a:bodyPr rtlCol="0" anchor="ctr"/>
+          <a:lstStyle/>
+          <a:p>
+            <a:pPr algn="ctr"/>
+            <a:endParaRPr lang="en-US"/>
+          </a:p>
+        </p:txBody>
+      </p:sp>
+      <p:sp>
+        <p:nvSpPr>
+          <p:cNvPr id="23" name="Triangle isocèle 22"/>
+          <p:cNvSpPr/>
+          <p:nvPr/>
+        </p:nvSpPr>
+        <p:spPr>
+          <a:xfrm flipV="1">
+            <a:off x="9941076" y="3500818"/>
+            <a:ext cx="212400" cy="244800"/>
+          </a:xfrm>
+          <a:prstGeom prst="triangle">
+            <a:avLst/>
+          </a:prstGeom>
+          <a:solidFill>
+            <a:srgbClr val="FFC000"/>
+          </a:solidFill>
+          <a:ln>
+            <a:noFill/>
+          </a:ln>
+        </p:spPr>
+        <p:style>
+          <a:lnRef idx="2">
+            <a:schemeClr val="accent1">
+              <a:shade val="50000"/>
+            </a:schemeClr>
+          </a:lnRef>
+          <a:fillRef idx="1">
+            <a:schemeClr val="accent1"/>
+          </a:fillRef>
+          <a:effectRef idx="0">
+            <a:schemeClr val="accent1"/>
+          </a:effectRef>
+          <a:fontRef idx="minor">
+            <a:schemeClr val="lt1"/>
+          </a:fontRef>
+        </p:style>
+        <p:txBody>
+          <a:bodyPr rtlCol="0" anchor="ctr"/>
+          <a:lstStyle/>
+          <a:p>
+            <a:pPr algn="ctr"/>
+            <a:endParaRPr lang="en-US"/>
+          </a:p>
+        </p:txBody>
+      </p:sp>
+      <p:sp>
+        <p:nvSpPr>
+          <p:cNvPr id="24" name="Triangle isocèle 23"/>
+          <p:cNvSpPr/>
+          <p:nvPr/>
+        </p:nvSpPr>
+        <p:spPr>
+          <a:xfrm flipV="1">
+            <a:off x="1984576" y="3497620"/>
+            <a:ext cx="212400" cy="244800"/>
+          </a:xfrm>
+          <a:prstGeom prst="triangle">
+            <a:avLst/>
+          </a:prstGeom>
+          <a:solidFill>
+            <a:srgbClr val="FFC000"/>
+          </a:solidFill>
+          <a:ln>
+            <a:noFill/>
+          </a:ln>
+        </p:spPr>
+        <p:style>
+          <a:lnRef idx="2">
+            <a:schemeClr val="accent1">
+              <a:shade val="50000"/>
+            </a:schemeClr>
+          </a:lnRef>
+          <a:fillRef idx="1">
+            <a:schemeClr val="accent1"/>
+          </a:fillRef>
+          <a:effectRef idx="0">
+            <a:schemeClr val="accent1"/>
+          </a:effectRef>
+          <a:fontRef idx="minor">
+            <a:schemeClr val="lt1"/>
+          </a:fontRef>
+        </p:style>
+        <p:txBody>
+          <a:bodyPr rtlCol="0" anchor="ctr"/>
+          <a:lstStyle/>
+          <a:p>
+            <a:pPr algn="ctr"/>
+            <a:endParaRPr lang="en-US"/>
           </a:p>
         </p:txBody>
       </p:sp>
     </p:spTree>
     <p:extLst>
       <p:ext uri="{BB962C8B-B14F-4D97-AF65-F5344CB8AC3E}">
-        <p14:creationId xmlns:p14="http://schemas.microsoft.com/office/powerpoint/2010/main" val="2110639596"/>
+        <p14:creationId xmlns:p14="http://schemas.microsoft.com/office/powerpoint/2010/main" val="2228419846"/>
       </p:ext>
     </p:extLst>
   </p:cSld>
@@ -4156,14 +5233,152 @@
       </p:grpSpPr>
       <p:pic>
         <p:nvPicPr>
-          <p:cNvPr id="4" name="Image 3"/>
+          <p:cNvPr id="29" name="Image 28"/>
           <p:cNvPicPr>
             <a:picLocks noChangeAspect="1"/>
           </p:cNvPicPr>
           <p:nvPr/>
         </p:nvPicPr>
         <p:blipFill>
-          <a:blip r:embed="rId2" cstate="print">
+          <a:blip r:embed="rId3">
+            <a:extLst>
+              <a:ext uri="{BEBA8EAE-BF5A-486C-A8C5-ECC9F3942E4B}">
+                <a14:imgProps xmlns:a14="http://schemas.microsoft.com/office/drawing/2010/main">
+                  <a14:imgLayer r:embed="rId4">
+                    <a14:imgEffect>
+                      <a14:colorTemperature colorTemp="11200"/>
+                    </a14:imgEffect>
+                    <a14:imgEffect>
+                      <a14:brightnessContrast bright="-20000" contrast="40000"/>
+                    </a14:imgEffect>
+                  </a14:imgLayer>
+                </a14:imgProps>
+              </a:ext>
+              <a:ext uri="{28A0092B-C50C-407E-A947-70E740481C1C}">
+                <a14:useLocalDpi xmlns:a14="http://schemas.microsoft.com/office/drawing/2010/main" val="0"/>
+              </a:ext>
+            </a:extLst>
+          </a:blip>
+          <a:stretch>
+            <a:fillRect/>
+          </a:stretch>
+        </p:blipFill>
+        <p:spPr>
+          <a:xfrm>
+            <a:off x="-62" y="1382394"/>
+            <a:ext cx="12192062" cy="5475606"/>
+          </a:xfrm>
+          <a:prstGeom prst="rect">
+            <a:avLst/>
+          </a:prstGeom>
+        </p:spPr>
+      </p:pic>
+      <p:sp>
+        <p:nvSpPr>
+          <p:cNvPr id="5" name="Rectangle 4"/>
+          <p:cNvSpPr/>
+          <p:nvPr/>
+        </p:nvSpPr>
+        <p:spPr>
+          <a:xfrm>
+            <a:off x="0" y="1382393"/>
+            <a:ext cx="12192000" cy="5475607"/>
+          </a:xfrm>
+          <a:prstGeom prst="rect">
+            <a:avLst/>
+          </a:prstGeom>
+          <a:solidFill>
+            <a:srgbClr val="000000">
+              <a:alpha val="60000"/>
+            </a:srgbClr>
+          </a:solidFill>
+        </p:spPr>
+        <p:style>
+          <a:lnRef idx="2">
+            <a:schemeClr val="accent1">
+              <a:shade val="50000"/>
+            </a:schemeClr>
+          </a:lnRef>
+          <a:fillRef idx="1">
+            <a:schemeClr val="accent1"/>
+          </a:fillRef>
+          <a:effectRef idx="0">
+            <a:schemeClr val="accent1"/>
+          </a:effectRef>
+          <a:fontRef idx="minor">
+            <a:schemeClr val="lt1"/>
+          </a:fontRef>
+        </p:style>
+        <p:txBody>
+          <a:bodyPr rtlCol="0" anchor="ctr"/>
+          <a:lstStyle/>
+          <a:p>
+            <a:pPr algn="ctr"/>
+            <a:endParaRPr lang="en-US"/>
+          </a:p>
+        </p:txBody>
+      </p:sp>
+      <p:sp>
+        <p:nvSpPr>
+          <p:cNvPr id="2" name="Rectangle 1"/>
+          <p:cNvSpPr/>
+          <p:nvPr/>
+        </p:nvSpPr>
+        <p:spPr>
+          <a:xfrm>
+            <a:off x="-62" y="1"/>
+            <a:ext cx="12192062" cy="1382392"/>
+          </a:xfrm>
+          <a:prstGeom prst="rect">
+            <a:avLst/>
+          </a:prstGeom>
+          <a:solidFill>
+            <a:schemeClr val="accent1">
+              <a:lumMod val="50000"/>
+            </a:schemeClr>
+          </a:solidFill>
+          <a:ln>
+            <a:noFill/>
+          </a:ln>
+        </p:spPr>
+        <p:style>
+          <a:lnRef idx="2">
+            <a:schemeClr val="accent1">
+              <a:shade val="50000"/>
+            </a:schemeClr>
+          </a:lnRef>
+          <a:fillRef idx="1">
+            <a:schemeClr val="accent1"/>
+          </a:fillRef>
+          <a:effectRef idx="0">
+            <a:schemeClr val="accent1"/>
+          </a:effectRef>
+          <a:fontRef idx="minor">
+            <a:schemeClr val="lt1"/>
+          </a:fontRef>
+        </p:style>
+        <p:txBody>
+          <a:bodyPr tIns="144000" rtlCol="0" anchor="t"/>
+          <a:lstStyle/>
+          <a:p>
+            <a:r>
+              <a:rPr lang="fr-CH" sz="4400" dirty="0" smtClean="0"/>
+              <a:t>Des objectifs ambitieux</a:t>
+            </a:r>
+            <a:endParaRPr lang="en-US" sz="4400" dirty="0"/>
+          </a:p>
+        </p:txBody>
+      </p:sp>
+      <p:pic>
+        <p:nvPicPr>
+          <p:cNvPr id="10" name="Image 9"/>
+          <p:cNvPicPr>
+            <a:picLocks noChangeAspect="1"/>
+          </p:cNvPicPr>
+          <p:nvPr/>
+        </p:nvPicPr>
+        <p:blipFill>
+          <a:blip r:embed="rId5">
             <a:extLst>
               <a:ext uri="{28A0092B-C50C-407E-A947-70E740481C1C}">
                 <a14:useLocalDpi xmlns:a14="http://schemas.microsoft.com/office/drawing/2010/main" val="0"/>
@@ -4176,8 +5391,559 @@
         </p:blipFill>
         <p:spPr>
           <a:xfrm>
-            <a:off x="3180582" y="685794"/>
-            <a:ext cx="5830836" cy="5486411"/>
+            <a:off x="5690970" y="2347189"/>
+            <a:ext cx="810057" cy="810057"/>
+          </a:xfrm>
+          <a:prstGeom prst="rect">
+            <a:avLst/>
+          </a:prstGeom>
+        </p:spPr>
+      </p:pic>
+      <p:pic>
+        <p:nvPicPr>
+          <p:cNvPr id="11" name="Image 10"/>
+          <p:cNvPicPr>
+            <a:picLocks noChangeAspect="1"/>
+          </p:cNvPicPr>
+          <p:nvPr/>
+        </p:nvPicPr>
+        <p:blipFill>
+          <a:blip r:embed="rId6">
+            <a:extLst>
+              <a:ext uri="{28A0092B-C50C-407E-A947-70E740481C1C}">
+                <a14:useLocalDpi xmlns:a14="http://schemas.microsoft.com/office/drawing/2010/main" val="0"/>
+              </a:ext>
+            </a:extLst>
+          </a:blip>
+          <a:stretch>
+            <a:fillRect/>
+          </a:stretch>
+        </p:blipFill>
+        <p:spPr>
+          <a:xfrm>
+            <a:off x="9709030" y="2380440"/>
+            <a:ext cx="810057" cy="810057"/>
+          </a:xfrm>
+          <a:prstGeom prst="rect">
+            <a:avLst/>
+          </a:prstGeom>
+        </p:spPr>
+      </p:pic>
+      <p:sp>
+        <p:nvSpPr>
+          <p:cNvPr id="3" name="Ellipse 2"/>
+          <p:cNvSpPr/>
+          <p:nvPr/>
+        </p:nvSpPr>
+        <p:spPr>
+          <a:xfrm>
+            <a:off x="1253305" y="2070120"/>
+            <a:ext cx="1440000" cy="1440000"/>
+          </a:xfrm>
+          <a:prstGeom prst="ellipse">
+            <a:avLst/>
+          </a:prstGeom>
+          <a:noFill/>
+          <a:ln>
+            <a:solidFill>
+              <a:schemeClr val="bg1"/>
+            </a:solidFill>
+          </a:ln>
+        </p:spPr>
+        <p:style>
+          <a:lnRef idx="2">
+            <a:schemeClr val="accent1">
+              <a:shade val="50000"/>
+            </a:schemeClr>
+          </a:lnRef>
+          <a:fillRef idx="1">
+            <a:schemeClr val="accent1"/>
+          </a:fillRef>
+          <a:effectRef idx="0">
+            <a:schemeClr val="accent1"/>
+          </a:effectRef>
+          <a:fontRef idx="minor">
+            <a:schemeClr val="lt1"/>
+          </a:fontRef>
+        </p:style>
+        <p:txBody>
+          <a:bodyPr rtlCol="0" anchor="ctr"/>
+          <a:lstStyle/>
+          <a:p>
+            <a:pPr algn="ctr"/>
+            <a:endParaRPr lang="en-US"/>
+          </a:p>
+        </p:txBody>
+      </p:sp>
+      <p:sp>
+        <p:nvSpPr>
+          <p:cNvPr id="13" name="Ellipse 12"/>
+          <p:cNvSpPr/>
+          <p:nvPr/>
+        </p:nvSpPr>
+        <p:spPr>
+          <a:xfrm>
+            <a:off x="9478349" y="2070120"/>
+            <a:ext cx="1440000" cy="1440000"/>
+          </a:xfrm>
+          <a:prstGeom prst="ellipse">
+            <a:avLst/>
+          </a:prstGeom>
+          <a:noFill/>
+          <a:ln>
+            <a:solidFill>
+              <a:schemeClr val="bg1"/>
+            </a:solidFill>
+          </a:ln>
+        </p:spPr>
+        <p:style>
+          <a:lnRef idx="2">
+            <a:schemeClr val="accent1">
+              <a:shade val="50000"/>
+            </a:schemeClr>
+          </a:lnRef>
+          <a:fillRef idx="1">
+            <a:schemeClr val="accent1"/>
+          </a:fillRef>
+          <a:effectRef idx="0">
+            <a:schemeClr val="accent1"/>
+          </a:effectRef>
+          <a:fontRef idx="minor">
+            <a:schemeClr val="lt1"/>
+          </a:fontRef>
+        </p:style>
+        <p:txBody>
+          <a:bodyPr rtlCol="0" anchor="ctr"/>
+          <a:lstStyle/>
+          <a:p>
+            <a:pPr algn="ctr"/>
+            <a:endParaRPr lang="en-US"/>
+          </a:p>
+        </p:txBody>
+      </p:sp>
+      <p:sp>
+        <p:nvSpPr>
+          <p:cNvPr id="14" name="Ellipse 13"/>
+          <p:cNvSpPr/>
+          <p:nvPr/>
+        </p:nvSpPr>
+        <p:spPr>
+          <a:xfrm>
+            <a:off x="5365827" y="2070120"/>
+            <a:ext cx="1440000" cy="1440000"/>
+          </a:xfrm>
+          <a:prstGeom prst="ellipse">
+            <a:avLst/>
+          </a:prstGeom>
+          <a:noFill/>
+          <a:ln>
+            <a:solidFill>
+              <a:schemeClr val="bg1"/>
+            </a:solidFill>
+          </a:ln>
+        </p:spPr>
+        <p:style>
+          <a:lnRef idx="2">
+            <a:schemeClr val="accent1">
+              <a:shade val="50000"/>
+            </a:schemeClr>
+          </a:lnRef>
+          <a:fillRef idx="1">
+            <a:schemeClr val="accent1"/>
+          </a:fillRef>
+          <a:effectRef idx="0">
+            <a:schemeClr val="accent1"/>
+          </a:effectRef>
+          <a:fontRef idx="minor">
+            <a:schemeClr val="lt1"/>
+          </a:fontRef>
+        </p:style>
+        <p:txBody>
+          <a:bodyPr rtlCol="0" anchor="ctr"/>
+          <a:lstStyle/>
+          <a:p>
+            <a:pPr algn="ctr"/>
+            <a:endParaRPr lang="en-US"/>
+          </a:p>
+        </p:txBody>
+      </p:sp>
+      <p:sp>
+        <p:nvSpPr>
+          <p:cNvPr id="15" name="ZoneTexte 14"/>
+          <p:cNvSpPr txBox="1"/>
+          <p:nvPr/>
+        </p:nvSpPr>
+        <p:spPr>
+          <a:xfrm>
+            <a:off x="451510" y="3759517"/>
+            <a:ext cx="3043589" cy="954107"/>
+          </a:xfrm>
+          <a:prstGeom prst="rect">
+            <a:avLst/>
+          </a:prstGeom>
+          <a:noFill/>
+        </p:spPr>
+        <p:txBody>
+          <a:bodyPr wrap="square" rtlCol="0">
+            <a:spAutoFit/>
+          </a:bodyPr>
+          <a:lstStyle/>
+          <a:p>
+            <a:pPr algn="ctr"/>
+            <a:r>
+              <a:rPr lang="fr-CH" sz="2800" b="1" dirty="0">
+                <a:solidFill>
+                  <a:schemeClr val="bg1"/>
+                </a:solidFill>
+                <a:latin typeface="Segoe UI Light" panose="020B0502040204020203" pitchFamily="34" charset="0"/>
+                <a:cs typeface="Segoe UI Light" panose="020B0502040204020203" pitchFamily="34" charset="0"/>
+              </a:rPr>
+              <a:t>Un très large choix de partition</a:t>
+            </a:r>
+            <a:endParaRPr lang="en-US" sz="2800" b="1" dirty="0">
+              <a:solidFill>
+                <a:schemeClr val="bg1"/>
+              </a:solidFill>
+              <a:latin typeface="Segoe UI Light" panose="020B0502040204020203" pitchFamily="34" charset="0"/>
+              <a:cs typeface="Segoe UI Light" panose="020B0502040204020203" pitchFamily="34" charset="0"/>
+            </a:endParaRPr>
+          </a:p>
+        </p:txBody>
+      </p:sp>
+      <p:sp>
+        <p:nvSpPr>
+          <p:cNvPr id="16" name="ZoneTexte 15"/>
+          <p:cNvSpPr txBox="1"/>
+          <p:nvPr/>
+        </p:nvSpPr>
+        <p:spPr>
+          <a:xfrm>
+            <a:off x="4875330" y="3759518"/>
+            <a:ext cx="2482910" cy="954107"/>
+          </a:xfrm>
+          <a:prstGeom prst="rect">
+            <a:avLst/>
+          </a:prstGeom>
+          <a:noFill/>
+        </p:spPr>
+        <p:txBody>
+          <a:bodyPr wrap="square" rtlCol="0">
+            <a:spAutoFit/>
+          </a:bodyPr>
+          <a:lstStyle/>
+          <a:p>
+            <a:pPr algn="ctr"/>
+            <a:r>
+              <a:rPr lang="fr-CH" sz="2800" b="1" dirty="0" smtClean="0">
+                <a:solidFill>
+                  <a:schemeClr val="bg1"/>
+                </a:solidFill>
+                <a:latin typeface="Segoe UI Light" panose="020B0502040204020203" pitchFamily="34" charset="0"/>
+                <a:cs typeface="Segoe UI Light" panose="020B0502040204020203" pitchFamily="34" charset="0"/>
+              </a:rPr>
+              <a:t>Une rapidité époustouflante</a:t>
+            </a:r>
+            <a:endParaRPr lang="en-US" sz="2800" b="1" dirty="0">
+              <a:solidFill>
+                <a:schemeClr val="bg1"/>
+              </a:solidFill>
+              <a:latin typeface="Segoe UI Light" panose="020B0502040204020203" pitchFamily="34" charset="0"/>
+              <a:cs typeface="Segoe UI Light" panose="020B0502040204020203" pitchFamily="34" charset="0"/>
+            </a:endParaRPr>
+          </a:p>
+        </p:txBody>
+      </p:sp>
+      <p:sp>
+        <p:nvSpPr>
+          <p:cNvPr id="17" name="ZoneTexte 16"/>
+          <p:cNvSpPr txBox="1"/>
+          <p:nvPr/>
+        </p:nvSpPr>
+        <p:spPr>
+          <a:xfrm>
+            <a:off x="8654571" y="3759517"/>
+            <a:ext cx="3087556" cy="954107"/>
+          </a:xfrm>
+          <a:prstGeom prst="rect">
+            <a:avLst/>
+          </a:prstGeom>
+          <a:noFill/>
+        </p:spPr>
+        <p:txBody>
+          <a:bodyPr wrap="square" rtlCol="0">
+            <a:spAutoFit/>
+          </a:bodyPr>
+          <a:lstStyle/>
+          <a:p>
+            <a:pPr algn="ctr"/>
+            <a:r>
+              <a:rPr lang="fr-CH" sz="2800" b="1" dirty="0">
+                <a:solidFill>
+                  <a:schemeClr val="bg1"/>
+                </a:solidFill>
+                <a:latin typeface="Segoe UI Light" panose="020B0502040204020203" pitchFamily="34" charset="0"/>
+                <a:cs typeface="Segoe UI Light" panose="020B0502040204020203" pitchFamily="34" charset="0"/>
+              </a:rPr>
+              <a:t>Une qualité </a:t>
+            </a:r>
+            <a:r>
+              <a:rPr lang="fr-CH" sz="2800" b="1" dirty="0" smtClean="0">
+                <a:solidFill>
+                  <a:schemeClr val="bg1"/>
+                </a:solidFill>
+                <a:latin typeface="Segoe UI Light" panose="020B0502040204020203" pitchFamily="34" charset="0"/>
+                <a:cs typeface="Segoe UI Light" panose="020B0502040204020203" pitchFamily="34" charset="0"/>
+              </a:rPr>
+              <a:t>sonore incroyable</a:t>
+            </a:r>
+            <a:endParaRPr lang="en-US" sz="2800" b="1" dirty="0">
+              <a:solidFill>
+                <a:schemeClr val="bg1"/>
+              </a:solidFill>
+              <a:latin typeface="Segoe UI Light" panose="020B0502040204020203" pitchFamily="34" charset="0"/>
+              <a:cs typeface="Segoe UI Light" panose="020B0502040204020203" pitchFamily="34" charset="0"/>
+            </a:endParaRPr>
+          </a:p>
+        </p:txBody>
+      </p:sp>
+      <p:sp>
+        <p:nvSpPr>
+          <p:cNvPr id="19" name="Triangle isocèle 18"/>
+          <p:cNvSpPr/>
+          <p:nvPr/>
+        </p:nvSpPr>
+        <p:spPr>
+          <a:xfrm flipV="1">
+            <a:off x="5770388" y="1113002"/>
+            <a:ext cx="651162" cy="575514"/>
+          </a:xfrm>
+          <a:prstGeom prst="triangle">
+            <a:avLst/>
+          </a:prstGeom>
+          <a:solidFill>
+            <a:srgbClr val="FFC000"/>
+          </a:solidFill>
+          <a:ln>
+            <a:noFill/>
+          </a:ln>
+        </p:spPr>
+        <p:style>
+          <a:lnRef idx="2">
+            <a:schemeClr val="accent1">
+              <a:shade val="50000"/>
+            </a:schemeClr>
+          </a:lnRef>
+          <a:fillRef idx="1">
+            <a:schemeClr val="accent1"/>
+          </a:fillRef>
+          <a:effectRef idx="0">
+            <a:schemeClr val="accent1"/>
+          </a:effectRef>
+          <a:fontRef idx="minor">
+            <a:schemeClr val="lt1"/>
+          </a:fontRef>
+        </p:style>
+        <p:txBody>
+          <a:bodyPr rtlCol="0" anchor="ctr"/>
+          <a:lstStyle/>
+          <a:p>
+            <a:pPr algn="ctr"/>
+            <a:endParaRPr lang="en-US"/>
+          </a:p>
+        </p:txBody>
+      </p:sp>
+      <p:sp>
+        <p:nvSpPr>
+          <p:cNvPr id="23" name="Triangle isocèle 22"/>
+          <p:cNvSpPr/>
+          <p:nvPr/>
+        </p:nvSpPr>
+        <p:spPr>
+          <a:xfrm flipV="1">
+            <a:off x="5984896" y="3500818"/>
+            <a:ext cx="212400" cy="244800"/>
+          </a:xfrm>
+          <a:prstGeom prst="triangle">
+            <a:avLst/>
+          </a:prstGeom>
+          <a:solidFill>
+            <a:srgbClr val="FFC000"/>
+          </a:solidFill>
+          <a:ln>
+            <a:noFill/>
+          </a:ln>
+        </p:spPr>
+        <p:style>
+          <a:lnRef idx="2">
+            <a:schemeClr val="accent1">
+              <a:shade val="50000"/>
+            </a:schemeClr>
+          </a:lnRef>
+          <a:fillRef idx="1">
+            <a:schemeClr val="accent1"/>
+          </a:fillRef>
+          <a:effectRef idx="0">
+            <a:schemeClr val="accent1"/>
+          </a:effectRef>
+          <a:fontRef idx="minor">
+            <a:schemeClr val="lt1"/>
+          </a:fontRef>
+        </p:style>
+        <p:txBody>
+          <a:bodyPr rtlCol="0" anchor="ctr"/>
+          <a:lstStyle/>
+          <a:p>
+            <a:pPr algn="ctr"/>
+            <a:endParaRPr lang="en-US"/>
+          </a:p>
+        </p:txBody>
+      </p:sp>
+      <p:sp>
+        <p:nvSpPr>
+          <p:cNvPr id="24" name="Triangle isocèle 23"/>
+          <p:cNvSpPr/>
+          <p:nvPr/>
+        </p:nvSpPr>
+        <p:spPr>
+          <a:xfrm flipV="1">
+            <a:off x="10105746" y="3500818"/>
+            <a:ext cx="212400" cy="244800"/>
+          </a:xfrm>
+          <a:prstGeom prst="triangle">
+            <a:avLst/>
+          </a:prstGeom>
+          <a:solidFill>
+            <a:srgbClr val="FFC000"/>
+          </a:solidFill>
+          <a:ln>
+            <a:noFill/>
+          </a:ln>
+        </p:spPr>
+        <p:style>
+          <a:lnRef idx="2">
+            <a:schemeClr val="accent1">
+              <a:shade val="50000"/>
+            </a:schemeClr>
+          </a:lnRef>
+          <a:fillRef idx="1">
+            <a:schemeClr val="accent1"/>
+          </a:fillRef>
+          <a:effectRef idx="0">
+            <a:schemeClr val="accent1"/>
+          </a:effectRef>
+          <a:fontRef idx="minor">
+            <a:schemeClr val="lt1"/>
+          </a:fontRef>
+        </p:style>
+        <p:txBody>
+          <a:bodyPr rtlCol="0" anchor="ctr"/>
+          <a:lstStyle/>
+          <a:p>
+            <a:pPr algn="ctr"/>
+            <a:endParaRPr lang="en-US"/>
+          </a:p>
+        </p:txBody>
+      </p:sp>
+      <p:sp>
+        <p:nvSpPr>
+          <p:cNvPr id="25" name="Triangle isocèle 24"/>
+          <p:cNvSpPr/>
+          <p:nvPr/>
+        </p:nvSpPr>
+        <p:spPr>
+          <a:xfrm flipV="1">
+            <a:off x="1864046" y="3500818"/>
+            <a:ext cx="212400" cy="244800"/>
+          </a:xfrm>
+          <a:prstGeom prst="triangle">
+            <a:avLst/>
+          </a:prstGeom>
+          <a:solidFill>
+            <a:srgbClr val="FFC000"/>
+          </a:solidFill>
+          <a:ln>
+            <a:noFill/>
+          </a:ln>
+        </p:spPr>
+        <p:style>
+          <a:lnRef idx="2">
+            <a:schemeClr val="accent1">
+              <a:shade val="50000"/>
+            </a:schemeClr>
+          </a:lnRef>
+          <a:fillRef idx="1">
+            <a:schemeClr val="accent1"/>
+          </a:fillRef>
+          <a:effectRef idx="0">
+            <a:schemeClr val="accent1"/>
+          </a:effectRef>
+          <a:fontRef idx="minor">
+            <a:schemeClr val="lt1"/>
+          </a:fontRef>
+        </p:style>
+        <p:txBody>
+          <a:bodyPr rtlCol="0" anchor="ctr"/>
+          <a:lstStyle/>
+          <a:p>
+            <a:pPr algn="ctr"/>
+            <a:endParaRPr lang="en-US"/>
+          </a:p>
+        </p:txBody>
+      </p:sp>
+      <p:pic>
+        <p:nvPicPr>
+          <p:cNvPr id="30" name="Image 29"/>
+          <p:cNvPicPr>
+            <a:picLocks noChangeAspect="1"/>
+          </p:cNvPicPr>
+          <p:nvPr/>
+        </p:nvPicPr>
+        <p:blipFill>
+          <a:blip r:embed="rId7">
+            <a:extLst>
+              <a:ext uri="{28A0092B-C50C-407E-A947-70E740481C1C}">
+                <a14:useLocalDpi xmlns:a14="http://schemas.microsoft.com/office/drawing/2010/main" val="0"/>
+              </a:ext>
+            </a:extLst>
+          </a:blip>
+          <a:stretch>
+            <a:fillRect/>
+          </a:stretch>
+        </p:blipFill>
+        <p:spPr>
+          <a:xfrm>
+            <a:off x="1565217" y="2381409"/>
+            <a:ext cx="810057" cy="810057"/>
+          </a:xfrm>
+          <a:prstGeom prst="rect">
+            <a:avLst/>
+          </a:prstGeom>
+        </p:spPr>
+      </p:pic>
+      <p:pic>
+        <p:nvPicPr>
+          <p:cNvPr id="20" name="Image 19"/>
+          <p:cNvPicPr>
+            <a:picLocks noChangeAspect="1"/>
+          </p:cNvPicPr>
+          <p:nvPr/>
+        </p:nvPicPr>
+        <p:blipFill>
+          <a:blip r:embed="rId8">
+            <a:extLst>
+              <a:ext uri="{28A0092B-C50C-407E-A947-70E740481C1C}">
+                <a14:useLocalDpi xmlns:a14="http://schemas.microsoft.com/office/drawing/2010/main" val="0"/>
+              </a:ext>
+            </a:extLst>
+          </a:blip>
+          <a:stretch>
+            <a:fillRect/>
+          </a:stretch>
+        </p:blipFill>
+        <p:spPr>
+          <a:xfrm>
+            <a:off x="10848106" y="194415"/>
+            <a:ext cx="1052493" cy="1052493"/>
           </a:xfrm>
           <a:prstGeom prst="rect">
             <a:avLst/>
@@ -4187,13 +5953,1959 @@
     </p:spTree>
     <p:extLst>
       <p:ext uri="{BB962C8B-B14F-4D97-AF65-F5344CB8AC3E}">
-        <p14:creationId xmlns:p14="http://schemas.microsoft.com/office/powerpoint/2010/main" val="2491532387"/>
+        <p14:creationId xmlns:p14="http://schemas.microsoft.com/office/powerpoint/2010/main" val="784479314"/>
       </p:ext>
     </p:extLst>
   </p:cSld>
   <p:clrMapOvr>
     <a:masterClrMapping/>
   </p:clrMapOvr>
+  <p:timing>
+    <p:tnLst>
+      <p:par>
+        <p:cTn id="1" dur="indefinite" restart="never" nodeType="tmRoot"/>
+      </p:par>
+    </p:tnLst>
+  </p:timing>
+</p:sld>
+</file>
+
+<file path=ppt/slides/slide6.xml><?xml version="1.0" encoding="utf-8"?>
+<p:sld xmlns:a="http://schemas.openxmlformats.org/drawingml/2006/main" xmlns:r="http://schemas.openxmlformats.org/officeDocument/2006/relationships" xmlns:p="http://schemas.openxmlformats.org/presentationml/2006/main">
+  <p:cSld>
+    <p:spTree>
+      <p:nvGrpSpPr>
+        <p:cNvPr id="1" name=""/>
+        <p:cNvGrpSpPr/>
+        <p:nvPr/>
+      </p:nvGrpSpPr>
+      <p:grpSpPr>
+        <a:xfrm>
+          <a:off x="0" y="0"/>
+          <a:ext cx="0" cy="0"/>
+          <a:chOff x="0" y="0"/>
+          <a:chExt cx="0" cy="0"/>
+        </a:xfrm>
+      </p:grpSpPr>
+      <p:pic>
+        <p:nvPicPr>
+          <p:cNvPr id="11" name="Image 10"/>
+          <p:cNvPicPr>
+            <a:picLocks noChangeAspect="1"/>
+          </p:cNvPicPr>
+          <p:nvPr/>
+        </p:nvPicPr>
+        <p:blipFill>
+          <a:blip r:embed="rId2">
+            <a:extLst>
+              <a:ext uri="{BEBA8EAE-BF5A-486C-A8C5-ECC9F3942E4B}">
+                <a14:imgProps xmlns:a14="http://schemas.microsoft.com/office/drawing/2010/main">
+                  <a14:imgLayer r:embed="rId3">
+                    <a14:imgEffect>
+                      <a14:colorTemperature colorTemp="11200"/>
+                    </a14:imgEffect>
+                    <a14:imgEffect>
+                      <a14:brightnessContrast bright="-40000" contrast="40000"/>
+                    </a14:imgEffect>
+                  </a14:imgLayer>
+                </a14:imgProps>
+              </a:ext>
+              <a:ext uri="{28A0092B-C50C-407E-A947-70E740481C1C}">
+                <a14:useLocalDpi xmlns:a14="http://schemas.microsoft.com/office/drawing/2010/main" val="0"/>
+              </a:ext>
+            </a:extLst>
+          </a:blip>
+          <a:stretch>
+            <a:fillRect/>
+          </a:stretch>
+        </p:blipFill>
+        <p:spPr>
+          <a:xfrm>
+            <a:off x="-62" y="1382394"/>
+            <a:ext cx="12192062" cy="5475606"/>
+          </a:xfrm>
+          <a:prstGeom prst="rect">
+            <a:avLst/>
+          </a:prstGeom>
+        </p:spPr>
+      </p:pic>
+      <p:sp>
+        <p:nvSpPr>
+          <p:cNvPr id="21" name="Rectangle 20"/>
+          <p:cNvSpPr/>
+          <p:nvPr/>
+        </p:nvSpPr>
+        <p:spPr>
+          <a:xfrm>
+            <a:off x="468257" y="1761976"/>
+            <a:ext cx="3600000" cy="2119312"/>
+          </a:xfrm>
+          <a:prstGeom prst="rect">
+            <a:avLst/>
+          </a:prstGeom>
+          <a:solidFill>
+            <a:srgbClr val="1CA01C"/>
+          </a:solidFill>
+          <a:ln w="38100">
+            <a:noFill/>
+          </a:ln>
+        </p:spPr>
+        <p:style>
+          <a:lnRef idx="2">
+            <a:schemeClr val="accent1">
+              <a:shade val="50000"/>
+            </a:schemeClr>
+          </a:lnRef>
+          <a:fillRef idx="1">
+            <a:schemeClr val="accent1"/>
+          </a:fillRef>
+          <a:effectRef idx="0">
+            <a:schemeClr val="accent1"/>
+          </a:effectRef>
+          <a:fontRef idx="minor">
+            <a:schemeClr val="lt1"/>
+          </a:fontRef>
+        </p:style>
+        <p:txBody>
+          <a:bodyPr rtlCol="0" anchor="b"/>
+          <a:lstStyle/>
+          <a:p>
+            <a:pPr algn="r"/>
+            <a:r>
+              <a:rPr lang="fr-CH" sz="2800" dirty="0" smtClean="0">
+                <a:latin typeface="Segoe UI Light" panose="020B0502040204020203" pitchFamily="34" charset="0"/>
+                <a:cs typeface="Segoe UI Light" panose="020B0502040204020203" pitchFamily="34" charset="0"/>
+              </a:rPr>
+              <a:t>Large choix de partition</a:t>
+            </a:r>
+            <a:endParaRPr lang="en-US" sz="2800" dirty="0">
+              <a:latin typeface="Segoe UI Light" panose="020B0502040204020203" pitchFamily="34" charset="0"/>
+              <a:cs typeface="Segoe UI Light" panose="020B0502040204020203" pitchFamily="34" charset="0"/>
+            </a:endParaRPr>
+          </a:p>
+        </p:txBody>
+      </p:sp>
+      <p:sp>
+        <p:nvSpPr>
+          <p:cNvPr id="22" name="Rectangle 21"/>
+          <p:cNvSpPr/>
+          <p:nvPr/>
+        </p:nvSpPr>
+        <p:spPr>
+          <a:xfrm>
+            <a:off x="4294375" y="1761975"/>
+            <a:ext cx="3600000" cy="2119313"/>
+          </a:xfrm>
+          <a:prstGeom prst="rect">
+            <a:avLst/>
+          </a:prstGeom>
+          <a:solidFill>
+            <a:schemeClr val="accent1">
+              <a:lumMod val="75000"/>
+            </a:schemeClr>
+          </a:solidFill>
+          <a:ln>
+            <a:noFill/>
+          </a:ln>
+        </p:spPr>
+        <p:style>
+          <a:lnRef idx="2">
+            <a:schemeClr val="accent1">
+              <a:shade val="50000"/>
+            </a:schemeClr>
+          </a:lnRef>
+          <a:fillRef idx="1">
+            <a:schemeClr val="accent1"/>
+          </a:fillRef>
+          <a:effectRef idx="0">
+            <a:schemeClr val="accent1"/>
+          </a:effectRef>
+          <a:fontRef idx="minor">
+            <a:schemeClr val="lt1"/>
+          </a:fontRef>
+        </p:style>
+        <p:txBody>
+          <a:bodyPr rtlCol="0" anchor="b"/>
+          <a:lstStyle/>
+          <a:p>
+            <a:pPr algn="r"/>
+            <a:r>
+              <a:rPr lang="fr-CH" sz="2800" dirty="0" smtClean="0">
+                <a:latin typeface="Segoe UI Light" panose="020B0502040204020203" pitchFamily="34" charset="0"/>
+                <a:cs typeface="Segoe UI Light" panose="020B0502040204020203" pitchFamily="34" charset="0"/>
+              </a:rPr>
+              <a:t>Rapidité époustouflante</a:t>
+            </a:r>
+            <a:endParaRPr lang="en-US" sz="2800" dirty="0">
+              <a:latin typeface="Segoe UI Light" panose="020B0502040204020203" pitchFamily="34" charset="0"/>
+              <a:cs typeface="Segoe UI Light" panose="020B0502040204020203" pitchFamily="34" charset="0"/>
+            </a:endParaRPr>
+          </a:p>
+        </p:txBody>
+      </p:sp>
+      <p:sp>
+        <p:nvSpPr>
+          <p:cNvPr id="23" name="Rectangle 22"/>
+          <p:cNvSpPr/>
+          <p:nvPr/>
+        </p:nvSpPr>
+        <p:spPr>
+          <a:xfrm>
+            <a:off x="8120493" y="1761975"/>
+            <a:ext cx="3600000" cy="2119313"/>
+          </a:xfrm>
+          <a:prstGeom prst="rect">
+            <a:avLst/>
+          </a:prstGeom>
+          <a:solidFill>
+            <a:srgbClr val="E09104"/>
+          </a:solidFill>
+          <a:ln>
+            <a:noFill/>
+          </a:ln>
+        </p:spPr>
+        <p:style>
+          <a:lnRef idx="2">
+            <a:schemeClr val="accent1">
+              <a:shade val="50000"/>
+            </a:schemeClr>
+          </a:lnRef>
+          <a:fillRef idx="1">
+            <a:schemeClr val="accent1"/>
+          </a:fillRef>
+          <a:effectRef idx="0">
+            <a:schemeClr val="accent1"/>
+          </a:effectRef>
+          <a:fontRef idx="minor">
+            <a:schemeClr val="lt1"/>
+          </a:fontRef>
+        </p:style>
+        <p:txBody>
+          <a:bodyPr rtlCol="0" anchor="b"/>
+          <a:lstStyle/>
+          <a:p>
+            <a:pPr algn="r"/>
+            <a:r>
+              <a:rPr lang="fr-CH" sz="2800" dirty="0" smtClean="0">
+                <a:latin typeface="Segoe UI Light" panose="020B0502040204020203" pitchFamily="34" charset="0"/>
+                <a:cs typeface="Segoe UI Light" panose="020B0502040204020203" pitchFamily="34" charset="0"/>
+              </a:rPr>
+              <a:t>Qualité de sonore incroyable</a:t>
+            </a:r>
+            <a:endParaRPr lang="en-US" sz="2800" dirty="0">
+              <a:latin typeface="Segoe UI Light" panose="020B0502040204020203" pitchFamily="34" charset="0"/>
+              <a:cs typeface="Segoe UI Light" panose="020B0502040204020203" pitchFamily="34" charset="0"/>
+            </a:endParaRPr>
+          </a:p>
+        </p:txBody>
+      </p:sp>
+      <p:pic>
+        <p:nvPicPr>
+          <p:cNvPr id="24" name="Image 23"/>
+          <p:cNvPicPr>
+            <a:picLocks noChangeAspect="1"/>
+          </p:cNvPicPr>
+          <p:nvPr/>
+        </p:nvPicPr>
+        <p:blipFill>
+          <a:blip r:embed="rId4">
+            <a:extLst>
+              <a:ext uri="{28A0092B-C50C-407E-A947-70E740481C1C}">
+                <a14:useLocalDpi xmlns:a14="http://schemas.microsoft.com/office/drawing/2010/main" val="0"/>
+              </a:ext>
+            </a:extLst>
+          </a:blip>
+          <a:stretch>
+            <a:fillRect/>
+          </a:stretch>
+        </p:blipFill>
+        <p:spPr>
+          <a:xfrm>
+            <a:off x="8224302" y="1906548"/>
+            <a:ext cx="810057" cy="810057"/>
+          </a:xfrm>
+          <a:prstGeom prst="rect">
+            <a:avLst/>
+          </a:prstGeom>
+        </p:spPr>
+      </p:pic>
+      <p:pic>
+        <p:nvPicPr>
+          <p:cNvPr id="25" name="Image 24"/>
+          <p:cNvPicPr>
+            <a:picLocks noChangeAspect="1"/>
+          </p:cNvPicPr>
+          <p:nvPr/>
+        </p:nvPicPr>
+        <p:blipFill>
+          <a:blip r:embed="rId5">
+            <a:extLst>
+              <a:ext uri="{28A0092B-C50C-407E-A947-70E740481C1C}">
+                <a14:useLocalDpi xmlns:a14="http://schemas.microsoft.com/office/drawing/2010/main" val="0"/>
+              </a:ext>
+            </a:extLst>
+          </a:blip>
+          <a:stretch>
+            <a:fillRect/>
+          </a:stretch>
+        </p:blipFill>
+        <p:spPr>
+          <a:xfrm>
+            <a:off x="4435879" y="1906547"/>
+            <a:ext cx="810057" cy="810057"/>
+          </a:xfrm>
+          <a:prstGeom prst="rect">
+            <a:avLst/>
+          </a:prstGeom>
+        </p:spPr>
+      </p:pic>
+      <p:pic>
+        <p:nvPicPr>
+          <p:cNvPr id="26" name="Image 25"/>
+          <p:cNvPicPr>
+            <a:picLocks noChangeAspect="1"/>
+          </p:cNvPicPr>
+          <p:nvPr/>
+        </p:nvPicPr>
+        <p:blipFill>
+          <a:blip r:embed="rId6">
+            <a:extLst>
+              <a:ext uri="{28A0092B-C50C-407E-A947-70E740481C1C}">
+                <a14:useLocalDpi xmlns:a14="http://schemas.microsoft.com/office/drawing/2010/main" val="0"/>
+              </a:ext>
+            </a:extLst>
+          </a:blip>
+          <a:stretch>
+            <a:fillRect/>
+          </a:stretch>
+        </p:blipFill>
+        <p:spPr>
+          <a:xfrm>
+            <a:off x="659719" y="1906546"/>
+            <a:ext cx="810057" cy="810057"/>
+          </a:xfrm>
+          <a:prstGeom prst="rect">
+            <a:avLst/>
+          </a:prstGeom>
+        </p:spPr>
+      </p:pic>
+      <p:sp>
+        <p:nvSpPr>
+          <p:cNvPr id="27" name="Rectangle 26"/>
+          <p:cNvSpPr/>
+          <p:nvPr/>
+        </p:nvSpPr>
+        <p:spPr>
+          <a:xfrm>
+            <a:off x="0" y="1"/>
+            <a:ext cx="12192000" cy="1429470"/>
+          </a:xfrm>
+          <a:prstGeom prst="rect">
+            <a:avLst/>
+          </a:prstGeom>
+          <a:solidFill>
+            <a:srgbClr val="002060"/>
+          </a:solidFill>
+          <a:ln>
+            <a:noFill/>
+          </a:ln>
+        </p:spPr>
+        <p:style>
+          <a:lnRef idx="2">
+            <a:schemeClr val="accent1">
+              <a:shade val="50000"/>
+            </a:schemeClr>
+          </a:lnRef>
+          <a:fillRef idx="1">
+            <a:schemeClr val="accent1"/>
+          </a:fillRef>
+          <a:effectRef idx="0">
+            <a:schemeClr val="accent1"/>
+          </a:effectRef>
+          <a:fontRef idx="minor">
+            <a:schemeClr val="lt1"/>
+          </a:fontRef>
+        </p:style>
+        <p:txBody>
+          <a:bodyPr tIns="144000" rtlCol="0" anchor="t"/>
+          <a:lstStyle/>
+          <a:p>
+            <a:r>
+              <a:rPr lang="fr-CH" sz="4400" dirty="0" smtClean="0">
+                <a:latin typeface="Segoe UI Light" panose="020B0502040204020203" pitchFamily="34" charset="0"/>
+                <a:cs typeface="Segoe UI Light" panose="020B0502040204020203" pitchFamily="34" charset="0"/>
+              </a:rPr>
+              <a:t>Des objectifs ambitieux</a:t>
+            </a:r>
+            <a:endParaRPr lang="en-US" sz="4400" dirty="0">
+              <a:latin typeface="Segoe UI Light" panose="020B0502040204020203" pitchFamily="34" charset="0"/>
+              <a:cs typeface="Segoe UI Light" panose="020B0502040204020203" pitchFamily="34" charset="0"/>
+            </a:endParaRPr>
+          </a:p>
+        </p:txBody>
+      </p:sp>
+      <p:pic>
+        <p:nvPicPr>
+          <p:cNvPr id="28" name="Image 27"/>
+          <p:cNvPicPr>
+            <a:picLocks noChangeAspect="1"/>
+          </p:cNvPicPr>
+          <p:nvPr/>
+        </p:nvPicPr>
+        <p:blipFill>
+          <a:blip r:embed="rId7">
+            <a:extLst>
+              <a:ext uri="{28A0092B-C50C-407E-A947-70E740481C1C}">
+                <a14:useLocalDpi xmlns:a14="http://schemas.microsoft.com/office/drawing/2010/main" val="0"/>
+              </a:ext>
+            </a:extLst>
+          </a:blip>
+          <a:stretch>
+            <a:fillRect/>
+          </a:stretch>
+        </p:blipFill>
+        <p:spPr>
+          <a:xfrm>
+            <a:off x="10848106" y="194415"/>
+            <a:ext cx="1052493" cy="1052493"/>
+          </a:xfrm>
+          <a:prstGeom prst="rect">
+            <a:avLst/>
+          </a:prstGeom>
+        </p:spPr>
+      </p:pic>
+    </p:spTree>
+    <p:extLst>
+      <p:ext uri="{BB962C8B-B14F-4D97-AF65-F5344CB8AC3E}">
+        <p14:creationId xmlns:p14="http://schemas.microsoft.com/office/powerpoint/2010/main" val="864811072"/>
+      </p:ext>
+    </p:extLst>
+  </p:cSld>
+  <p:clrMapOvr>
+    <a:masterClrMapping/>
+  </p:clrMapOvr>
+  <p:timing>
+    <p:tnLst>
+      <p:par>
+        <p:cTn id="1" dur="indefinite" restart="never" nodeType="tmRoot"/>
+      </p:par>
+    </p:tnLst>
+  </p:timing>
+</p:sld>
+</file>
+
+<file path=ppt/slides/slide7.xml><?xml version="1.0" encoding="utf-8"?>
+<p:sld xmlns:a="http://schemas.openxmlformats.org/drawingml/2006/main" xmlns:r="http://schemas.openxmlformats.org/officeDocument/2006/relationships" xmlns:p="http://schemas.openxmlformats.org/presentationml/2006/main">
+  <p:cSld>
+    <p:spTree>
+      <p:nvGrpSpPr>
+        <p:cNvPr id="1" name=""/>
+        <p:cNvGrpSpPr/>
+        <p:nvPr/>
+      </p:nvGrpSpPr>
+      <p:grpSpPr>
+        <a:xfrm>
+          <a:off x="0" y="0"/>
+          <a:ext cx="0" cy="0"/>
+          <a:chOff x="0" y="0"/>
+          <a:chExt cx="0" cy="0"/>
+        </a:xfrm>
+      </p:grpSpPr>
+      <p:sp>
+        <p:nvSpPr>
+          <p:cNvPr id="6" name="Rectangle 5"/>
+          <p:cNvSpPr/>
+          <p:nvPr/>
+        </p:nvSpPr>
+        <p:spPr>
+          <a:xfrm>
+            <a:off x="0" y="1429471"/>
+            <a:ext cx="12192000" cy="5428529"/>
+          </a:xfrm>
+          <a:prstGeom prst="rect">
+            <a:avLst/>
+          </a:prstGeom>
+          <a:solidFill>
+            <a:srgbClr val="080808">
+              <a:alpha val="20000"/>
+            </a:srgbClr>
+          </a:solidFill>
+          <a:ln>
+            <a:noFill/>
+          </a:ln>
+        </p:spPr>
+        <p:style>
+          <a:lnRef idx="2">
+            <a:schemeClr val="accent1">
+              <a:shade val="50000"/>
+            </a:schemeClr>
+          </a:lnRef>
+          <a:fillRef idx="1">
+            <a:schemeClr val="accent1"/>
+          </a:fillRef>
+          <a:effectRef idx="0">
+            <a:schemeClr val="accent1"/>
+          </a:effectRef>
+          <a:fontRef idx="minor">
+            <a:schemeClr val="lt1"/>
+          </a:fontRef>
+        </p:style>
+        <p:txBody>
+          <a:bodyPr rtlCol="0" anchor="ctr"/>
+          <a:lstStyle/>
+          <a:p>
+            <a:pPr algn="ctr"/>
+            <a:endParaRPr lang="en-US"/>
+          </a:p>
+        </p:txBody>
+      </p:sp>
+      <p:sp>
+        <p:nvSpPr>
+          <p:cNvPr id="95" name="Ellipse 94"/>
+          <p:cNvSpPr/>
+          <p:nvPr/>
+        </p:nvSpPr>
+        <p:spPr>
+          <a:xfrm>
+            <a:off x="3239827" y="5563211"/>
+            <a:ext cx="1207587" cy="1210267"/>
+          </a:xfrm>
+          <a:prstGeom prst="ellipse">
+            <a:avLst/>
+          </a:prstGeom>
+          <a:solidFill>
+            <a:srgbClr val="A0CC00"/>
+          </a:solidFill>
+          <a:ln>
+            <a:noFill/>
+          </a:ln>
+        </p:spPr>
+        <p:style>
+          <a:lnRef idx="2">
+            <a:schemeClr val="accent1">
+              <a:shade val="50000"/>
+            </a:schemeClr>
+          </a:lnRef>
+          <a:fillRef idx="1">
+            <a:schemeClr val="accent1"/>
+          </a:fillRef>
+          <a:effectRef idx="0">
+            <a:schemeClr val="accent1"/>
+          </a:effectRef>
+          <a:fontRef idx="minor">
+            <a:schemeClr val="lt1"/>
+          </a:fontRef>
+        </p:style>
+        <p:txBody>
+          <a:bodyPr rtlCol="0" anchor="ctr"/>
+          <a:lstStyle/>
+          <a:p>
+            <a:pPr algn="ctr"/>
+            <a:endParaRPr lang="en-US"/>
+          </a:p>
+        </p:txBody>
+      </p:sp>
+      <p:sp>
+        <p:nvSpPr>
+          <p:cNvPr id="2" name="Ellipse 1"/>
+          <p:cNvSpPr/>
+          <p:nvPr/>
+        </p:nvSpPr>
+        <p:spPr>
+          <a:xfrm>
+            <a:off x="525820" y="2567796"/>
+            <a:ext cx="1368000" cy="1368000"/>
+          </a:xfrm>
+          <a:prstGeom prst="ellipse">
+            <a:avLst/>
+          </a:prstGeom>
+          <a:solidFill>
+            <a:srgbClr val="FFC000"/>
+          </a:solidFill>
+          <a:ln>
+            <a:noFill/>
+          </a:ln>
+        </p:spPr>
+        <p:style>
+          <a:lnRef idx="2">
+            <a:schemeClr val="accent1">
+              <a:shade val="50000"/>
+            </a:schemeClr>
+          </a:lnRef>
+          <a:fillRef idx="1">
+            <a:schemeClr val="accent1"/>
+          </a:fillRef>
+          <a:effectRef idx="0">
+            <a:schemeClr val="accent1"/>
+          </a:effectRef>
+          <a:fontRef idx="minor">
+            <a:schemeClr val="lt1"/>
+          </a:fontRef>
+        </p:style>
+        <p:txBody>
+          <a:bodyPr rtlCol="0" anchor="ctr"/>
+          <a:lstStyle/>
+          <a:p>
+            <a:pPr algn="ctr"/>
+            <a:endParaRPr lang="en-US"/>
+          </a:p>
+        </p:txBody>
+      </p:sp>
+      <p:pic>
+        <p:nvPicPr>
+          <p:cNvPr id="3" name="Image 2"/>
+          <p:cNvPicPr>
+            <a:picLocks noChangeAspect="1"/>
+          </p:cNvPicPr>
+          <p:nvPr/>
+        </p:nvPicPr>
+        <p:blipFill>
+          <a:blip r:embed="rId2">
+            <a:extLst>
+              <a:ext uri="{28A0092B-C50C-407E-A947-70E740481C1C}">
+                <a14:useLocalDpi xmlns:a14="http://schemas.microsoft.com/office/drawing/2010/main" val="0"/>
+              </a:ext>
+            </a:extLst>
+          </a:blip>
+          <a:stretch>
+            <a:fillRect/>
+          </a:stretch>
+        </p:blipFill>
+        <p:spPr>
+          <a:xfrm>
+            <a:off x="711725" y="2753263"/>
+            <a:ext cx="987623" cy="987623"/>
+          </a:xfrm>
+          <a:prstGeom prst="rect">
+            <a:avLst/>
+          </a:prstGeom>
+        </p:spPr>
+      </p:pic>
+      <p:sp>
+        <p:nvSpPr>
+          <p:cNvPr id="5" name="Ellipse 4"/>
+          <p:cNvSpPr/>
+          <p:nvPr/>
+        </p:nvSpPr>
+        <p:spPr>
+          <a:xfrm>
+            <a:off x="7198448" y="2567795"/>
+            <a:ext cx="1368000" cy="1368000"/>
+          </a:xfrm>
+          <a:prstGeom prst="ellipse">
+            <a:avLst/>
+          </a:prstGeom>
+          <a:solidFill>
+            <a:srgbClr val="0070C0"/>
+          </a:solidFill>
+          <a:ln>
+            <a:noFill/>
+          </a:ln>
+        </p:spPr>
+        <p:style>
+          <a:lnRef idx="2">
+            <a:schemeClr val="accent1">
+              <a:shade val="50000"/>
+            </a:schemeClr>
+          </a:lnRef>
+          <a:fillRef idx="1">
+            <a:schemeClr val="accent1"/>
+          </a:fillRef>
+          <a:effectRef idx="0">
+            <a:schemeClr val="accent1"/>
+          </a:effectRef>
+          <a:fontRef idx="minor">
+            <a:schemeClr val="lt1"/>
+          </a:fontRef>
+        </p:style>
+        <p:txBody>
+          <a:bodyPr rtlCol="0" anchor="ctr"/>
+          <a:lstStyle/>
+          <a:p>
+            <a:pPr algn="ctr"/>
+            <a:endParaRPr lang="en-US"/>
+          </a:p>
+        </p:txBody>
+      </p:sp>
+      <p:pic>
+        <p:nvPicPr>
+          <p:cNvPr id="4" name="Image 3"/>
+          <p:cNvPicPr>
+            <a:picLocks noChangeAspect="1"/>
+          </p:cNvPicPr>
+          <p:nvPr/>
+        </p:nvPicPr>
+        <p:blipFill>
+          <a:blip r:embed="rId3">
+            <a:extLst>
+              <a:ext uri="{28A0092B-C50C-407E-A947-70E740481C1C}">
+                <a14:useLocalDpi xmlns:a14="http://schemas.microsoft.com/office/drawing/2010/main" val="0"/>
+              </a:ext>
+            </a:extLst>
+          </a:blip>
+          <a:stretch>
+            <a:fillRect/>
+          </a:stretch>
+        </p:blipFill>
+        <p:spPr>
+          <a:xfrm>
+            <a:off x="7392919" y="2757425"/>
+            <a:ext cx="979057" cy="983461"/>
+          </a:xfrm>
+          <a:prstGeom prst="rect">
+            <a:avLst/>
+          </a:prstGeom>
+        </p:spPr>
+      </p:pic>
+      <p:cxnSp>
+        <p:nvCxnSpPr>
+          <p:cNvPr id="7" name="Connecteur droit 6"/>
+          <p:cNvCxnSpPr>
+            <a:stCxn id="2" idx="6"/>
+            <a:endCxn id="36" idx="2"/>
+          </p:cNvCxnSpPr>
+          <p:nvPr/>
+        </p:nvCxnSpPr>
+        <p:spPr>
+          <a:xfrm flipV="1">
+            <a:off x="1893820" y="3251795"/>
+            <a:ext cx="2037592" cy="1"/>
+          </a:xfrm>
+          <a:prstGeom prst="line">
+            <a:avLst/>
+          </a:prstGeom>
+          <a:ln w="76200">
+            <a:solidFill>
+              <a:srgbClr val="EA4726"/>
+            </a:solidFill>
+            <a:prstDash val="solid"/>
+          </a:ln>
+        </p:spPr>
+        <p:style>
+          <a:lnRef idx="1">
+            <a:schemeClr val="accent1"/>
+          </a:lnRef>
+          <a:fillRef idx="0">
+            <a:schemeClr val="accent1"/>
+          </a:fillRef>
+          <a:effectRef idx="0">
+            <a:schemeClr val="accent1"/>
+          </a:effectRef>
+          <a:fontRef idx="minor">
+            <a:schemeClr val="tx1"/>
+          </a:fontRef>
+        </p:style>
+      </p:cxnSp>
+      <p:sp>
+        <p:nvSpPr>
+          <p:cNvPr id="9" name="Ellipse 8"/>
+          <p:cNvSpPr/>
+          <p:nvPr/>
+        </p:nvSpPr>
+        <p:spPr>
+          <a:xfrm>
+            <a:off x="7198448" y="5004934"/>
+            <a:ext cx="1368000" cy="1368000"/>
+          </a:xfrm>
+          <a:prstGeom prst="ellipse">
+            <a:avLst/>
+          </a:prstGeom>
+          <a:solidFill>
+            <a:srgbClr val="20B620"/>
+          </a:solidFill>
+          <a:ln>
+            <a:noFill/>
+          </a:ln>
+        </p:spPr>
+        <p:style>
+          <a:lnRef idx="2">
+            <a:schemeClr val="accent1">
+              <a:shade val="50000"/>
+            </a:schemeClr>
+          </a:lnRef>
+          <a:fillRef idx="1">
+            <a:schemeClr val="accent1"/>
+          </a:fillRef>
+          <a:effectRef idx="0">
+            <a:schemeClr val="accent1"/>
+          </a:effectRef>
+          <a:fontRef idx="minor">
+            <a:schemeClr val="lt1"/>
+          </a:fontRef>
+        </p:style>
+        <p:txBody>
+          <a:bodyPr rtlCol="0" anchor="ctr"/>
+          <a:lstStyle/>
+          <a:p>
+            <a:pPr algn="ctr"/>
+            <a:endParaRPr lang="en-US"/>
+          </a:p>
+        </p:txBody>
+      </p:sp>
+      <p:pic>
+        <p:nvPicPr>
+          <p:cNvPr id="8" name="Image 7"/>
+          <p:cNvPicPr>
+            <a:picLocks noChangeAspect="1"/>
+          </p:cNvPicPr>
+          <p:nvPr/>
+        </p:nvPicPr>
+        <p:blipFill>
+          <a:blip r:embed="rId4">
+            <a:extLst>
+              <a:ext uri="{28A0092B-C50C-407E-A947-70E740481C1C}">
+                <a14:useLocalDpi xmlns:a14="http://schemas.microsoft.com/office/drawing/2010/main" val="0"/>
+              </a:ext>
+            </a:extLst>
+          </a:blip>
+          <a:stretch>
+            <a:fillRect/>
+          </a:stretch>
+        </p:blipFill>
+        <p:spPr>
+          <a:xfrm>
+            <a:off x="7316739" y="5108602"/>
+            <a:ext cx="1131418" cy="1131418"/>
+          </a:xfrm>
+          <a:prstGeom prst="rect">
+            <a:avLst/>
+          </a:prstGeom>
+        </p:spPr>
+      </p:pic>
+      <p:cxnSp>
+        <p:nvCxnSpPr>
+          <p:cNvPr id="12" name="Connecteur droit 11"/>
+          <p:cNvCxnSpPr>
+            <a:endCxn id="14" idx="2"/>
+          </p:cNvCxnSpPr>
+          <p:nvPr/>
+        </p:nvCxnSpPr>
+        <p:spPr>
+          <a:xfrm flipV="1">
+            <a:off x="6331527" y="2546792"/>
+            <a:ext cx="1" cy="700282"/>
+          </a:xfrm>
+          <a:prstGeom prst="line">
+            <a:avLst/>
+          </a:prstGeom>
+          <a:ln w="76200">
+            <a:solidFill>
+              <a:srgbClr val="EA4726"/>
+            </a:solidFill>
+            <a:prstDash val="sysDash"/>
+          </a:ln>
+        </p:spPr>
+        <p:style>
+          <a:lnRef idx="1">
+            <a:schemeClr val="accent1"/>
+          </a:lnRef>
+          <a:fillRef idx="0">
+            <a:schemeClr val="accent1"/>
+          </a:fillRef>
+          <a:effectRef idx="0">
+            <a:schemeClr val="accent1"/>
+          </a:effectRef>
+          <a:fontRef idx="minor">
+            <a:schemeClr val="tx1"/>
+          </a:fontRef>
+        </p:style>
+      </p:cxnSp>
+      <p:cxnSp>
+        <p:nvCxnSpPr>
+          <p:cNvPr id="13" name="Connecteur droit 12"/>
+          <p:cNvCxnSpPr>
+            <a:endCxn id="18" idx="1"/>
+          </p:cNvCxnSpPr>
+          <p:nvPr/>
+        </p:nvCxnSpPr>
+        <p:spPr>
+          <a:xfrm>
+            <a:off x="7882448" y="4433813"/>
+            <a:ext cx="1280343" cy="6768"/>
+          </a:xfrm>
+          <a:prstGeom prst="line">
+            <a:avLst/>
+          </a:prstGeom>
+          <a:ln w="76200">
+            <a:solidFill>
+              <a:srgbClr val="EA4726"/>
+            </a:solidFill>
+            <a:prstDash val="sysDash"/>
+          </a:ln>
+        </p:spPr>
+        <p:style>
+          <a:lnRef idx="1">
+            <a:schemeClr val="accent1"/>
+          </a:lnRef>
+          <a:fillRef idx="0">
+            <a:schemeClr val="accent1"/>
+          </a:fillRef>
+          <a:effectRef idx="0">
+            <a:schemeClr val="accent1"/>
+          </a:effectRef>
+          <a:fontRef idx="minor">
+            <a:schemeClr val="tx1"/>
+          </a:fontRef>
+        </p:style>
+      </p:cxnSp>
+      <p:sp>
+        <p:nvSpPr>
+          <p:cNvPr id="14" name="Rectangle 13"/>
+          <p:cNvSpPr/>
+          <p:nvPr/>
+        </p:nvSpPr>
+        <p:spPr>
+          <a:xfrm>
+            <a:off x="5587128" y="1608733"/>
+            <a:ext cx="1488799" cy="938059"/>
+          </a:xfrm>
+          <a:prstGeom prst="rect">
+            <a:avLst/>
+          </a:prstGeom>
+          <a:solidFill>
+            <a:schemeClr val="bg1">
+              <a:lumMod val="50000"/>
+            </a:schemeClr>
+          </a:solidFill>
+          <a:ln w="38100">
+            <a:noFill/>
+          </a:ln>
+        </p:spPr>
+        <p:style>
+          <a:lnRef idx="2">
+            <a:schemeClr val="accent1">
+              <a:shade val="50000"/>
+            </a:schemeClr>
+          </a:lnRef>
+          <a:fillRef idx="1">
+            <a:schemeClr val="accent1"/>
+          </a:fillRef>
+          <a:effectRef idx="0">
+            <a:schemeClr val="accent1"/>
+          </a:effectRef>
+          <a:fontRef idx="minor">
+            <a:schemeClr val="lt1"/>
+          </a:fontRef>
+        </p:style>
+        <p:txBody>
+          <a:bodyPr rtlCol="0" anchor="b"/>
+          <a:lstStyle/>
+          <a:p>
+            <a:pPr algn="r"/>
+            <a:r>
+              <a:rPr lang="fr-CH" sz="2800" dirty="0" smtClean="0">
+                <a:latin typeface="Segoe UI Light" panose="020B0502040204020203" pitchFamily="34" charset="0"/>
+                <a:cs typeface="Segoe UI Light" panose="020B0502040204020203" pitchFamily="34" charset="0"/>
+              </a:rPr>
+              <a:t>USB</a:t>
+            </a:r>
+            <a:endParaRPr lang="en-US" sz="2800" dirty="0">
+              <a:latin typeface="Segoe UI Light" panose="020B0502040204020203" pitchFamily="34" charset="0"/>
+              <a:cs typeface="Segoe UI Light" panose="020B0502040204020203" pitchFamily="34" charset="0"/>
+            </a:endParaRPr>
+          </a:p>
+        </p:txBody>
+      </p:sp>
+      <p:sp>
+        <p:nvSpPr>
+          <p:cNvPr id="15" name="Rectangle 14"/>
+          <p:cNvSpPr/>
+          <p:nvPr/>
+        </p:nvSpPr>
+        <p:spPr>
+          <a:xfrm>
+            <a:off x="2210513" y="1614697"/>
+            <a:ext cx="1586606" cy="936597"/>
+          </a:xfrm>
+          <a:prstGeom prst="rect">
+            <a:avLst/>
+          </a:prstGeom>
+          <a:solidFill>
+            <a:schemeClr val="bg1">
+              <a:lumMod val="50000"/>
+            </a:schemeClr>
+          </a:solidFill>
+          <a:ln w="38100">
+            <a:noFill/>
+          </a:ln>
+        </p:spPr>
+        <p:style>
+          <a:lnRef idx="2">
+            <a:schemeClr val="accent1">
+              <a:shade val="50000"/>
+            </a:schemeClr>
+          </a:lnRef>
+          <a:fillRef idx="1">
+            <a:schemeClr val="accent1"/>
+          </a:fillRef>
+          <a:effectRef idx="0">
+            <a:schemeClr val="accent1"/>
+          </a:effectRef>
+          <a:fontRef idx="minor">
+            <a:schemeClr val="lt1"/>
+          </a:fontRef>
+        </p:style>
+        <p:txBody>
+          <a:bodyPr rtlCol="0" anchor="b"/>
+          <a:lstStyle/>
+          <a:p>
+            <a:pPr algn="r"/>
+            <a:r>
+              <a:rPr lang="fr-CH" sz="2800" dirty="0" smtClean="0">
+                <a:latin typeface="Segoe UI Light" panose="020B0502040204020203" pitchFamily="34" charset="0"/>
+                <a:cs typeface="Segoe UI Light" panose="020B0502040204020203" pitchFamily="34" charset="0"/>
+              </a:rPr>
+              <a:t>I2C</a:t>
+            </a:r>
+            <a:endParaRPr lang="en-US" sz="2800" dirty="0">
+              <a:latin typeface="Segoe UI Light" panose="020B0502040204020203" pitchFamily="34" charset="0"/>
+              <a:cs typeface="Segoe UI Light" panose="020B0502040204020203" pitchFamily="34" charset="0"/>
+            </a:endParaRPr>
+          </a:p>
+        </p:txBody>
+      </p:sp>
+      <p:pic>
+        <p:nvPicPr>
+          <p:cNvPr id="16" name="Image 15"/>
+          <p:cNvPicPr>
+            <a:picLocks noChangeAspect="1"/>
+          </p:cNvPicPr>
+          <p:nvPr/>
+        </p:nvPicPr>
+        <p:blipFill>
+          <a:blip r:embed="rId5">
+            <a:extLst>
+              <a:ext uri="{28A0092B-C50C-407E-A947-70E740481C1C}">
+                <a14:useLocalDpi xmlns:a14="http://schemas.microsoft.com/office/drawing/2010/main" val="0"/>
+              </a:ext>
+            </a:extLst>
+          </a:blip>
+          <a:stretch>
+            <a:fillRect/>
+          </a:stretch>
+        </p:blipFill>
+        <p:spPr>
+          <a:xfrm>
+            <a:off x="5655664" y="1677364"/>
+            <a:ext cx="648154" cy="648154"/>
+          </a:xfrm>
+          <a:prstGeom prst="rect">
+            <a:avLst/>
+          </a:prstGeom>
+        </p:spPr>
+      </p:pic>
+      <p:sp>
+        <p:nvSpPr>
+          <p:cNvPr id="18" name="Rectangle 17"/>
+          <p:cNvSpPr/>
+          <p:nvPr/>
+        </p:nvSpPr>
+        <p:spPr>
+          <a:xfrm>
+            <a:off x="9162791" y="3906393"/>
+            <a:ext cx="2093228" cy="1068375"/>
+          </a:xfrm>
+          <a:prstGeom prst="rect">
+            <a:avLst/>
+          </a:prstGeom>
+          <a:solidFill>
+            <a:schemeClr val="bg1">
+              <a:lumMod val="50000"/>
+            </a:schemeClr>
+          </a:solidFill>
+          <a:ln w="38100">
+            <a:noFill/>
+          </a:ln>
+        </p:spPr>
+        <p:style>
+          <a:lnRef idx="2">
+            <a:schemeClr val="accent1">
+              <a:shade val="50000"/>
+            </a:schemeClr>
+          </a:lnRef>
+          <a:fillRef idx="1">
+            <a:schemeClr val="accent1"/>
+          </a:fillRef>
+          <a:effectRef idx="0">
+            <a:schemeClr val="accent1"/>
+          </a:effectRef>
+          <a:fontRef idx="minor">
+            <a:schemeClr val="lt1"/>
+          </a:fontRef>
+        </p:style>
+        <p:txBody>
+          <a:bodyPr rtlCol="0" anchor="b"/>
+          <a:lstStyle/>
+          <a:p>
+            <a:pPr algn="r"/>
+            <a:r>
+              <a:rPr lang="fr-CH" sz="2800" dirty="0" smtClean="0">
+                <a:latin typeface="Segoe UI Light" panose="020B0502040204020203" pitchFamily="34" charset="0"/>
+                <a:cs typeface="Segoe UI Light" panose="020B0502040204020203" pitchFamily="34" charset="0"/>
+              </a:rPr>
+              <a:t>WOOPSA</a:t>
+            </a:r>
+            <a:endParaRPr lang="en-US" sz="2800" dirty="0">
+              <a:latin typeface="Segoe UI Light" panose="020B0502040204020203" pitchFamily="34" charset="0"/>
+              <a:cs typeface="Segoe UI Light" panose="020B0502040204020203" pitchFamily="34" charset="0"/>
+            </a:endParaRPr>
+          </a:p>
+        </p:txBody>
+      </p:sp>
+      <p:pic>
+        <p:nvPicPr>
+          <p:cNvPr id="19" name="Image 18"/>
+          <p:cNvPicPr>
+            <a:picLocks noChangeAspect="1"/>
+          </p:cNvPicPr>
+          <p:nvPr/>
+        </p:nvPicPr>
+        <p:blipFill>
+          <a:blip r:embed="rId6">
+            <a:extLst>
+              <a:ext uri="{28A0092B-C50C-407E-A947-70E740481C1C}">
+                <a14:useLocalDpi xmlns:a14="http://schemas.microsoft.com/office/drawing/2010/main" val="0"/>
+              </a:ext>
+            </a:extLst>
+          </a:blip>
+          <a:stretch>
+            <a:fillRect/>
+          </a:stretch>
+        </p:blipFill>
+        <p:spPr>
+          <a:xfrm>
+            <a:off x="2210512" y="1681906"/>
+            <a:ext cx="657379" cy="657379"/>
+          </a:xfrm>
+          <a:prstGeom prst="rect">
+            <a:avLst/>
+          </a:prstGeom>
+        </p:spPr>
+      </p:pic>
+      <p:pic>
+        <p:nvPicPr>
+          <p:cNvPr id="20" name="Image 19"/>
+          <p:cNvPicPr>
+            <a:picLocks noChangeAspect="1"/>
+          </p:cNvPicPr>
+          <p:nvPr/>
+        </p:nvPicPr>
+        <p:blipFill>
+          <a:blip r:embed="rId7"/>
+          <a:stretch>
+            <a:fillRect/>
+          </a:stretch>
+        </p:blipFill>
+        <p:spPr>
+          <a:xfrm>
+            <a:off x="9264208" y="4007810"/>
+            <a:ext cx="612078" cy="624320"/>
+          </a:xfrm>
+          <a:prstGeom prst="rect">
+            <a:avLst/>
+          </a:prstGeom>
+        </p:spPr>
+      </p:pic>
+      <p:cxnSp>
+        <p:nvCxnSpPr>
+          <p:cNvPr id="27" name="Connecteur droit 26"/>
+          <p:cNvCxnSpPr>
+            <a:stCxn id="5" idx="4"/>
+            <a:endCxn id="9" idx="0"/>
+          </p:cNvCxnSpPr>
+          <p:nvPr/>
+        </p:nvCxnSpPr>
+        <p:spPr>
+          <a:xfrm>
+            <a:off x="7882448" y="3935795"/>
+            <a:ext cx="0" cy="1069139"/>
+          </a:xfrm>
+          <a:prstGeom prst="line">
+            <a:avLst/>
+          </a:prstGeom>
+          <a:ln w="76200">
+            <a:solidFill>
+              <a:srgbClr val="EA4726"/>
+            </a:solidFill>
+            <a:prstDash val="solid"/>
+          </a:ln>
+        </p:spPr>
+        <p:style>
+          <a:lnRef idx="1">
+            <a:schemeClr val="accent1"/>
+          </a:lnRef>
+          <a:fillRef idx="0">
+            <a:schemeClr val="accent1"/>
+          </a:fillRef>
+          <a:effectRef idx="0">
+            <a:schemeClr val="accent1"/>
+          </a:effectRef>
+          <a:fontRef idx="minor">
+            <a:schemeClr val="tx1"/>
+          </a:fontRef>
+        </p:style>
+      </p:cxnSp>
+      <p:sp>
+        <p:nvSpPr>
+          <p:cNvPr id="36" name="Ellipse 35"/>
+          <p:cNvSpPr/>
+          <p:nvPr/>
+        </p:nvSpPr>
+        <p:spPr>
+          <a:xfrm>
+            <a:off x="3931412" y="2567795"/>
+            <a:ext cx="1383428" cy="1368000"/>
+          </a:xfrm>
+          <a:prstGeom prst="ellipse">
+            <a:avLst/>
+          </a:prstGeom>
+          <a:solidFill>
+            <a:srgbClr val="7030A0"/>
+          </a:solidFill>
+          <a:ln>
+            <a:noFill/>
+          </a:ln>
+        </p:spPr>
+        <p:style>
+          <a:lnRef idx="2">
+            <a:schemeClr val="accent1">
+              <a:shade val="50000"/>
+            </a:schemeClr>
+          </a:lnRef>
+          <a:fillRef idx="1">
+            <a:schemeClr val="accent1"/>
+          </a:fillRef>
+          <a:effectRef idx="0">
+            <a:schemeClr val="accent1"/>
+          </a:effectRef>
+          <a:fontRef idx="minor">
+            <a:schemeClr val="lt1"/>
+          </a:fontRef>
+        </p:style>
+        <p:txBody>
+          <a:bodyPr rtlCol="0" anchor="ctr"/>
+          <a:lstStyle/>
+          <a:p>
+            <a:pPr algn="ctr"/>
+            <a:endParaRPr lang="en-US"/>
+          </a:p>
+        </p:txBody>
+      </p:sp>
+      <p:cxnSp>
+        <p:nvCxnSpPr>
+          <p:cNvPr id="38" name="Connecteur droit 37"/>
+          <p:cNvCxnSpPr>
+            <a:stCxn id="5" idx="2"/>
+            <a:endCxn id="36" idx="6"/>
+          </p:cNvCxnSpPr>
+          <p:nvPr/>
+        </p:nvCxnSpPr>
+        <p:spPr>
+          <a:xfrm flipH="1">
+            <a:off x="5314840" y="3251795"/>
+            <a:ext cx="1883608" cy="0"/>
+          </a:xfrm>
+          <a:prstGeom prst="line">
+            <a:avLst/>
+          </a:prstGeom>
+          <a:ln w="76200">
+            <a:solidFill>
+              <a:srgbClr val="EA4726"/>
+            </a:solidFill>
+            <a:prstDash val="solid"/>
+          </a:ln>
+        </p:spPr>
+        <p:style>
+          <a:lnRef idx="1">
+            <a:schemeClr val="accent1"/>
+          </a:lnRef>
+          <a:fillRef idx="0">
+            <a:schemeClr val="accent1"/>
+          </a:fillRef>
+          <a:effectRef idx="0">
+            <a:schemeClr val="accent1"/>
+          </a:effectRef>
+          <a:fontRef idx="minor">
+            <a:schemeClr val="tx1"/>
+          </a:fontRef>
+        </p:style>
+      </p:cxnSp>
+      <p:pic>
+        <p:nvPicPr>
+          <p:cNvPr id="35" name="Image 34"/>
+          <p:cNvPicPr>
+            <a:picLocks noChangeAspect="1"/>
+          </p:cNvPicPr>
+          <p:nvPr/>
+        </p:nvPicPr>
+        <p:blipFill>
+          <a:blip r:embed="rId8">
+            <a:extLst>
+              <a:ext uri="{28A0092B-C50C-407E-A947-70E740481C1C}">
+                <a14:useLocalDpi xmlns:a14="http://schemas.microsoft.com/office/drawing/2010/main" val="0"/>
+              </a:ext>
+            </a:extLst>
+          </a:blip>
+          <a:stretch>
+            <a:fillRect/>
+          </a:stretch>
+        </p:blipFill>
+        <p:spPr>
+          <a:xfrm>
+            <a:off x="4125884" y="2753263"/>
+            <a:ext cx="987624" cy="987624"/>
+          </a:xfrm>
+          <a:prstGeom prst="rect">
+            <a:avLst/>
+          </a:prstGeom>
+        </p:spPr>
+      </p:pic>
+      <p:cxnSp>
+        <p:nvCxnSpPr>
+          <p:cNvPr id="63" name="Connecteur droit 62"/>
+          <p:cNvCxnSpPr>
+            <a:endCxn id="15" idx="2"/>
+          </p:cNvCxnSpPr>
+          <p:nvPr/>
+        </p:nvCxnSpPr>
+        <p:spPr>
+          <a:xfrm flipV="1">
+            <a:off x="3003816" y="2551294"/>
+            <a:ext cx="0" cy="695780"/>
+          </a:xfrm>
+          <a:prstGeom prst="line">
+            <a:avLst/>
+          </a:prstGeom>
+          <a:ln w="76200">
+            <a:solidFill>
+              <a:srgbClr val="EA4726"/>
+            </a:solidFill>
+            <a:prstDash val="sysDash"/>
+          </a:ln>
+        </p:spPr>
+        <p:style>
+          <a:lnRef idx="1">
+            <a:schemeClr val="accent1"/>
+          </a:lnRef>
+          <a:fillRef idx="0">
+            <a:schemeClr val="accent1"/>
+          </a:fillRef>
+          <a:effectRef idx="0">
+            <a:schemeClr val="accent1"/>
+          </a:effectRef>
+          <a:fontRef idx="minor">
+            <a:schemeClr val="tx1"/>
+          </a:fontRef>
+        </p:style>
+      </p:cxnSp>
+      <p:sp>
+        <p:nvSpPr>
+          <p:cNvPr id="83" name="Rectangle 82"/>
+          <p:cNvSpPr/>
+          <p:nvPr/>
+        </p:nvSpPr>
+        <p:spPr>
+          <a:xfrm>
+            <a:off x="0" y="1"/>
+            <a:ext cx="12192000" cy="1429470"/>
+          </a:xfrm>
+          <a:prstGeom prst="rect">
+            <a:avLst/>
+          </a:prstGeom>
+          <a:solidFill>
+            <a:srgbClr val="002060"/>
+          </a:solidFill>
+          <a:ln>
+            <a:noFill/>
+          </a:ln>
+        </p:spPr>
+        <p:style>
+          <a:lnRef idx="2">
+            <a:schemeClr val="accent1">
+              <a:shade val="50000"/>
+            </a:schemeClr>
+          </a:lnRef>
+          <a:fillRef idx="1">
+            <a:schemeClr val="accent1"/>
+          </a:fillRef>
+          <a:effectRef idx="0">
+            <a:schemeClr val="accent1"/>
+          </a:effectRef>
+          <a:fontRef idx="minor">
+            <a:schemeClr val="lt1"/>
+          </a:fontRef>
+        </p:style>
+        <p:txBody>
+          <a:bodyPr tIns="144000" rtlCol="0" anchor="t"/>
+          <a:lstStyle/>
+          <a:p>
+            <a:r>
+              <a:rPr lang="fr-CH" sz="4400" dirty="0" smtClean="0"/>
+              <a:t>Communication efficace</a:t>
+            </a:r>
+            <a:endParaRPr lang="en-US" sz="4400" dirty="0"/>
+          </a:p>
+        </p:txBody>
+      </p:sp>
+      <p:sp>
+        <p:nvSpPr>
+          <p:cNvPr id="86" name="Ellipse 85"/>
+          <p:cNvSpPr/>
+          <p:nvPr/>
+        </p:nvSpPr>
+        <p:spPr>
+          <a:xfrm>
+            <a:off x="3239827" y="4007810"/>
+            <a:ext cx="1207587" cy="1210267"/>
+          </a:xfrm>
+          <a:prstGeom prst="ellipse">
+            <a:avLst/>
+          </a:prstGeom>
+          <a:solidFill>
+            <a:srgbClr val="A0CC00"/>
+          </a:solidFill>
+          <a:ln>
+            <a:noFill/>
+          </a:ln>
+        </p:spPr>
+        <p:style>
+          <a:lnRef idx="2">
+            <a:schemeClr val="accent1">
+              <a:shade val="50000"/>
+            </a:schemeClr>
+          </a:lnRef>
+          <a:fillRef idx="1">
+            <a:schemeClr val="accent1"/>
+          </a:fillRef>
+          <a:effectRef idx="0">
+            <a:schemeClr val="accent1"/>
+          </a:effectRef>
+          <a:fontRef idx="minor">
+            <a:schemeClr val="lt1"/>
+          </a:fontRef>
+        </p:style>
+        <p:txBody>
+          <a:bodyPr rtlCol="0" anchor="ctr"/>
+          <a:lstStyle/>
+          <a:p>
+            <a:pPr algn="ctr"/>
+            <a:endParaRPr lang="en-US"/>
+          </a:p>
+        </p:txBody>
+      </p:sp>
+      <p:pic>
+        <p:nvPicPr>
+          <p:cNvPr id="87" name="Image 86"/>
+          <p:cNvPicPr>
+            <a:picLocks noChangeAspect="1"/>
+          </p:cNvPicPr>
+          <p:nvPr/>
+        </p:nvPicPr>
+        <p:blipFill>
+          <a:blip r:embed="rId9">
+            <a:extLst>
+              <a:ext uri="{28A0092B-C50C-407E-A947-70E740481C1C}">
+                <a14:useLocalDpi xmlns:a14="http://schemas.microsoft.com/office/drawing/2010/main" val="0"/>
+              </a:ext>
+            </a:extLst>
+          </a:blip>
+          <a:stretch>
+            <a:fillRect/>
+          </a:stretch>
+        </p:blipFill>
+        <p:spPr>
+          <a:xfrm>
+            <a:off x="3418543" y="4187866"/>
+            <a:ext cx="850155" cy="850155"/>
+          </a:xfrm>
+          <a:prstGeom prst="rect">
+            <a:avLst/>
+          </a:prstGeom>
+        </p:spPr>
+      </p:pic>
+      <p:cxnSp>
+        <p:nvCxnSpPr>
+          <p:cNvPr id="88" name="Connecteur droit 87"/>
+          <p:cNvCxnSpPr>
+            <a:stCxn id="86" idx="6"/>
+            <a:endCxn id="9" idx="2"/>
+          </p:cNvCxnSpPr>
+          <p:nvPr/>
+        </p:nvCxnSpPr>
+        <p:spPr>
+          <a:xfrm>
+            <a:off x="4447414" y="4612944"/>
+            <a:ext cx="2751034" cy="1075990"/>
+          </a:xfrm>
+          <a:prstGeom prst="line">
+            <a:avLst/>
+          </a:prstGeom>
+          <a:ln w="76200">
+            <a:solidFill>
+              <a:srgbClr val="EA4726"/>
+            </a:solidFill>
+            <a:prstDash val="sysDash"/>
+          </a:ln>
+        </p:spPr>
+        <p:style>
+          <a:lnRef idx="1">
+            <a:schemeClr val="accent1"/>
+          </a:lnRef>
+          <a:fillRef idx="0">
+            <a:schemeClr val="accent1"/>
+          </a:fillRef>
+          <a:effectRef idx="0">
+            <a:schemeClr val="accent1"/>
+          </a:effectRef>
+          <a:fontRef idx="minor">
+            <a:schemeClr val="tx1"/>
+          </a:fontRef>
+        </p:style>
+      </p:cxnSp>
+      <p:pic>
+        <p:nvPicPr>
+          <p:cNvPr id="94" name="Image 93"/>
+          <p:cNvPicPr>
+            <a:picLocks noChangeAspect="1"/>
+          </p:cNvPicPr>
+          <p:nvPr/>
+        </p:nvPicPr>
+        <p:blipFill>
+          <a:blip r:embed="rId10">
+            <a:extLst>
+              <a:ext uri="{28A0092B-C50C-407E-A947-70E740481C1C}">
+                <a14:useLocalDpi xmlns:a14="http://schemas.microsoft.com/office/drawing/2010/main" val="0"/>
+              </a:ext>
+            </a:extLst>
+          </a:blip>
+          <a:stretch>
+            <a:fillRect/>
+          </a:stretch>
+        </p:blipFill>
+        <p:spPr>
+          <a:xfrm>
+            <a:off x="3529273" y="5843197"/>
+            <a:ext cx="650296" cy="650296"/>
+          </a:xfrm>
+          <a:prstGeom prst="rect">
+            <a:avLst/>
+          </a:prstGeom>
+        </p:spPr>
+      </p:pic>
+      <p:cxnSp>
+        <p:nvCxnSpPr>
+          <p:cNvPr id="96" name="Connecteur droit 95"/>
+          <p:cNvCxnSpPr>
+            <a:stCxn id="95" idx="6"/>
+            <a:endCxn id="9" idx="2"/>
+          </p:cNvCxnSpPr>
+          <p:nvPr/>
+        </p:nvCxnSpPr>
+        <p:spPr>
+          <a:xfrm flipV="1">
+            <a:off x="4447414" y="5688934"/>
+            <a:ext cx="2751034" cy="479411"/>
+          </a:xfrm>
+          <a:prstGeom prst="line">
+            <a:avLst/>
+          </a:prstGeom>
+          <a:ln w="76200">
+            <a:solidFill>
+              <a:srgbClr val="EA4726"/>
+            </a:solidFill>
+            <a:prstDash val="sysDash"/>
+          </a:ln>
+        </p:spPr>
+        <p:style>
+          <a:lnRef idx="1">
+            <a:schemeClr val="accent1"/>
+          </a:lnRef>
+          <a:fillRef idx="0">
+            <a:schemeClr val="accent1"/>
+          </a:fillRef>
+          <a:effectRef idx="0">
+            <a:schemeClr val="accent1"/>
+          </a:effectRef>
+          <a:fontRef idx="minor">
+            <a:schemeClr val="tx1"/>
+          </a:fontRef>
+        </p:style>
+      </p:cxnSp>
+      <p:pic>
+        <p:nvPicPr>
+          <p:cNvPr id="121" name="Image 120"/>
+          <p:cNvPicPr>
+            <a:picLocks noChangeAspect="1"/>
+          </p:cNvPicPr>
+          <p:nvPr/>
+        </p:nvPicPr>
+        <p:blipFill>
+          <a:blip r:embed="rId11">
+            <a:extLst>
+              <a:ext uri="{28A0092B-C50C-407E-A947-70E740481C1C}">
+                <a14:useLocalDpi xmlns:a14="http://schemas.microsoft.com/office/drawing/2010/main" val="0"/>
+              </a:ext>
+            </a:extLst>
+          </a:blip>
+          <a:stretch>
+            <a:fillRect/>
+          </a:stretch>
+        </p:blipFill>
+        <p:spPr>
+          <a:xfrm>
+            <a:off x="10827761" y="164235"/>
+            <a:ext cx="1101002" cy="1101002"/>
+          </a:xfrm>
+          <a:prstGeom prst="rect">
+            <a:avLst/>
+          </a:prstGeom>
+        </p:spPr>
+      </p:pic>
+    </p:spTree>
+    <p:extLst>
+      <p:ext uri="{BB962C8B-B14F-4D97-AF65-F5344CB8AC3E}">
+        <p14:creationId xmlns:p14="http://schemas.microsoft.com/office/powerpoint/2010/main" val="2110639596"/>
+      </p:ext>
+    </p:extLst>
+  </p:cSld>
+  <p:clrMapOvr>
+    <a:masterClrMapping/>
+  </p:clrMapOvr>
+  <p:timing>
+    <p:tnLst>
+      <p:par>
+        <p:cTn id="1" dur="indefinite" restart="never" nodeType="tmRoot"/>
+      </p:par>
+    </p:tnLst>
+  </p:timing>
+</p:sld>
+</file>
+
+<file path=ppt/slides/slide8.xml><?xml version="1.0" encoding="utf-8"?>
+<p:sld xmlns:a="http://schemas.openxmlformats.org/drawingml/2006/main" xmlns:r="http://schemas.openxmlformats.org/officeDocument/2006/relationships" xmlns:p="http://schemas.openxmlformats.org/presentationml/2006/main">
+  <p:cSld>
+    <p:spTree>
+      <p:nvGrpSpPr>
+        <p:cNvPr id="1" name=""/>
+        <p:cNvGrpSpPr/>
+        <p:nvPr/>
+      </p:nvGrpSpPr>
+      <p:grpSpPr>
+        <a:xfrm>
+          <a:off x="0" y="0"/>
+          <a:ext cx="0" cy="0"/>
+          <a:chOff x="0" y="0"/>
+          <a:chExt cx="0" cy="0"/>
+        </a:xfrm>
+      </p:grpSpPr>
+      <p:sp>
+        <p:nvSpPr>
+          <p:cNvPr id="3" name="Rectangle 2"/>
+          <p:cNvSpPr/>
+          <p:nvPr/>
+        </p:nvSpPr>
+        <p:spPr>
+          <a:xfrm>
+            <a:off x="0" y="1"/>
+            <a:ext cx="12192000" cy="1429470"/>
+          </a:xfrm>
+          <a:prstGeom prst="rect">
+            <a:avLst/>
+          </a:prstGeom>
+          <a:solidFill>
+            <a:srgbClr val="002060"/>
+          </a:solidFill>
+          <a:ln>
+            <a:noFill/>
+          </a:ln>
+        </p:spPr>
+        <p:style>
+          <a:lnRef idx="2">
+            <a:schemeClr val="accent1">
+              <a:shade val="50000"/>
+            </a:schemeClr>
+          </a:lnRef>
+          <a:fillRef idx="1">
+            <a:schemeClr val="accent1"/>
+          </a:fillRef>
+          <a:effectRef idx="0">
+            <a:schemeClr val="accent1"/>
+          </a:effectRef>
+          <a:fontRef idx="minor">
+            <a:schemeClr val="lt1"/>
+          </a:fontRef>
+        </p:style>
+        <p:txBody>
+          <a:bodyPr tIns="144000" rtlCol="0" anchor="t"/>
+          <a:lstStyle/>
+          <a:p>
+            <a:r>
+              <a:rPr lang="fr-CH" sz="4400" dirty="0" smtClean="0"/>
+              <a:t>UML</a:t>
+            </a:r>
+            <a:endParaRPr lang="en-US" sz="4400" dirty="0"/>
+          </a:p>
+        </p:txBody>
+      </p:sp>
+      <p:pic>
+        <p:nvPicPr>
+          <p:cNvPr id="2" name="Image 1"/>
+          <p:cNvPicPr>
+            <a:picLocks noChangeAspect="1"/>
+          </p:cNvPicPr>
+          <p:nvPr/>
+        </p:nvPicPr>
+        <p:blipFill>
+          <a:blip r:embed="rId2">
+            <a:extLst>
+              <a:ext uri="{28A0092B-C50C-407E-A947-70E740481C1C}">
+                <a14:useLocalDpi xmlns:a14="http://schemas.microsoft.com/office/drawing/2010/main" val="0"/>
+              </a:ext>
+            </a:extLst>
+          </a:blip>
+          <a:stretch>
+            <a:fillRect/>
+          </a:stretch>
+        </p:blipFill>
+        <p:spPr>
+          <a:xfrm>
+            <a:off x="10827761" y="150379"/>
+            <a:ext cx="1128713" cy="1128713"/>
+          </a:xfrm>
+          <a:prstGeom prst="rect">
+            <a:avLst/>
+          </a:prstGeom>
+        </p:spPr>
+      </p:pic>
+      <p:sp>
+        <p:nvSpPr>
+          <p:cNvPr id="4" name="Rectangle 3"/>
+          <p:cNvSpPr/>
+          <p:nvPr/>
+        </p:nvSpPr>
+        <p:spPr>
+          <a:xfrm>
+            <a:off x="0" y="1429471"/>
+            <a:ext cx="12192000" cy="5428529"/>
+          </a:xfrm>
+          <a:prstGeom prst="rect">
+            <a:avLst/>
+          </a:prstGeom>
+          <a:solidFill>
+            <a:srgbClr val="080808">
+              <a:alpha val="20000"/>
+            </a:srgbClr>
+          </a:solidFill>
+          <a:ln>
+            <a:noFill/>
+          </a:ln>
+        </p:spPr>
+        <p:style>
+          <a:lnRef idx="2">
+            <a:schemeClr val="accent1">
+              <a:shade val="50000"/>
+            </a:schemeClr>
+          </a:lnRef>
+          <a:fillRef idx="1">
+            <a:schemeClr val="accent1"/>
+          </a:fillRef>
+          <a:effectRef idx="0">
+            <a:schemeClr val="accent1"/>
+          </a:effectRef>
+          <a:fontRef idx="minor">
+            <a:schemeClr val="lt1"/>
+          </a:fontRef>
+        </p:style>
+        <p:txBody>
+          <a:bodyPr rtlCol="0" anchor="ctr"/>
+          <a:lstStyle/>
+          <a:p>
+            <a:pPr algn="ctr"/>
+            <a:endParaRPr lang="en-US"/>
+          </a:p>
+        </p:txBody>
+      </p:sp>
+    </p:spTree>
+    <p:extLst>
+      <p:ext uri="{BB962C8B-B14F-4D97-AF65-F5344CB8AC3E}">
+        <p14:creationId xmlns:p14="http://schemas.microsoft.com/office/powerpoint/2010/main" val="1689277395"/>
+      </p:ext>
+    </p:extLst>
+  </p:cSld>
+  <p:clrMapOvr>
+    <a:masterClrMapping/>
+  </p:clrMapOvr>
+  <p:timing>
+    <p:tnLst>
+      <p:par>
+        <p:cTn id="1" dur="indefinite" restart="never" nodeType="tmRoot"/>
+      </p:par>
+    </p:tnLst>
+  </p:timing>
+</p:sld>
+</file>
+
+<file path=ppt/slides/slide9.xml><?xml version="1.0" encoding="utf-8"?>
+<p:sld xmlns:a="http://schemas.openxmlformats.org/drawingml/2006/main" xmlns:r="http://schemas.openxmlformats.org/officeDocument/2006/relationships" xmlns:p="http://schemas.openxmlformats.org/presentationml/2006/main">
+  <p:cSld>
+    <p:spTree>
+      <p:nvGrpSpPr>
+        <p:cNvPr id="1" name=""/>
+        <p:cNvGrpSpPr/>
+        <p:nvPr/>
+      </p:nvGrpSpPr>
+      <p:grpSpPr>
+        <a:xfrm>
+          <a:off x="0" y="0"/>
+          <a:ext cx="0" cy="0"/>
+          <a:chOff x="0" y="0"/>
+          <a:chExt cx="0" cy="0"/>
+        </a:xfrm>
+      </p:grpSpPr>
+      <p:sp>
+        <p:nvSpPr>
+          <p:cNvPr id="3" name="Rectangle 2"/>
+          <p:cNvSpPr/>
+          <p:nvPr/>
+        </p:nvSpPr>
+        <p:spPr>
+          <a:xfrm>
+            <a:off x="0" y="1"/>
+            <a:ext cx="12192000" cy="1429470"/>
+          </a:xfrm>
+          <a:prstGeom prst="rect">
+            <a:avLst/>
+          </a:prstGeom>
+          <a:solidFill>
+            <a:srgbClr val="002060"/>
+          </a:solidFill>
+          <a:ln>
+            <a:noFill/>
+          </a:ln>
+        </p:spPr>
+        <p:style>
+          <a:lnRef idx="2">
+            <a:schemeClr val="accent1">
+              <a:shade val="50000"/>
+            </a:schemeClr>
+          </a:lnRef>
+          <a:fillRef idx="1">
+            <a:schemeClr val="accent1"/>
+          </a:fillRef>
+          <a:effectRef idx="0">
+            <a:schemeClr val="accent1"/>
+          </a:effectRef>
+          <a:fontRef idx="minor">
+            <a:schemeClr val="lt1"/>
+          </a:fontRef>
+        </p:style>
+        <p:txBody>
+          <a:bodyPr tIns="144000" rtlCol="0" anchor="t"/>
+          <a:lstStyle/>
+          <a:p>
+            <a:r>
+              <a:rPr lang="fr-CH" sz="4400" dirty="0" smtClean="0"/>
+              <a:t>Visuel magnifique </a:t>
+            </a:r>
+            <a:endParaRPr lang="en-US" sz="4400" dirty="0"/>
+          </a:p>
+        </p:txBody>
+      </p:sp>
+      <p:pic>
+        <p:nvPicPr>
+          <p:cNvPr id="4" name="Image 3"/>
+          <p:cNvPicPr>
+            <a:picLocks noChangeAspect="1"/>
+          </p:cNvPicPr>
+          <p:nvPr/>
+        </p:nvPicPr>
+        <p:blipFill>
+          <a:blip r:embed="rId2">
+            <a:extLst>
+              <a:ext uri="{28A0092B-C50C-407E-A947-70E740481C1C}">
+                <a14:useLocalDpi xmlns:a14="http://schemas.microsoft.com/office/drawing/2010/main" val="0"/>
+              </a:ext>
+            </a:extLst>
+          </a:blip>
+          <a:stretch>
+            <a:fillRect/>
+          </a:stretch>
+        </p:blipFill>
+        <p:spPr>
+          <a:xfrm>
+            <a:off x="10897034" y="236971"/>
+            <a:ext cx="927820" cy="927820"/>
+          </a:xfrm>
+          <a:prstGeom prst="rect">
+            <a:avLst/>
+          </a:prstGeom>
+        </p:spPr>
+      </p:pic>
+      <p:sp>
+        <p:nvSpPr>
+          <p:cNvPr id="5" name="Rectangle 4"/>
+          <p:cNvSpPr/>
+          <p:nvPr/>
+        </p:nvSpPr>
+        <p:spPr>
+          <a:xfrm>
+            <a:off x="0" y="1429471"/>
+            <a:ext cx="12192000" cy="5428529"/>
+          </a:xfrm>
+          <a:prstGeom prst="rect">
+            <a:avLst/>
+          </a:prstGeom>
+          <a:solidFill>
+            <a:srgbClr val="080808">
+              <a:alpha val="20000"/>
+            </a:srgbClr>
+          </a:solidFill>
+          <a:ln>
+            <a:noFill/>
+          </a:ln>
+        </p:spPr>
+        <p:style>
+          <a:lnRef idx="2">
+            <a:schemeClr val="accent1">
+              <a:shade val="50000"/>
+            </a:schemeClr>
+          </a:lnRef>
+          <a:fillRef idx="1">
+            <a:schemeClr val="accent1"/>
+          </a:fillRef>
+          <a:effectRef idx="0">
+            <a:schemeClr val="accent1"/>
+          </a:effectRef>
+          <a:fontRef idx="minor">
+            <a:schemeClr val="lt1"/>
+          </a:fontRef>
+        </p:style>
+        <p:txBody>
+          <a:bodyPr rtlCol="0" anchor="ctr"/>
+          <a:lstStyle/>
+          <a:p>
+            <a:pPr algn="ctr"/>
+            <a:endParaRPr lang="en-US"/>
+          </a:p>
+        </p:txBody>
+      </p:sp>
+    </p:spTree>
+    <p:extLst>
+      <p:ext uri="{BB962C8B-B14F-4D97-AF65-F5344CB8AC3E}">
+        <p14:creationId xmlns:p14="http://schemas.microsoft.com/office/powerpoint/2010/main" val="255669450"/>
+      </p:ext>
+    </p:extLst>
+  </p:cSld>
+  <p:clrMapOvr>
+    <a:masterClrMapping/>
+  </p:clrMapOvr>
+  <p:timing>
+    <p:tnLst>
+      <p:par>
+        <p:cTn id="1" dur="indefinite" restart="never" nodeType="tmRoot"/>
+      </p:par>
+    </p:tnLst>
+  </p:timing>
 </p:sld>
 </file>
 

</xml_diff>